<commit_message>
Change slides back to old instructions
</commit_message>
<xml_diff>
--- a/nivturk-prolific/app/static/Instructions/instructions_DST/instructions_DST.pptx
+++ b/nivturk-prolific/app/static/Instructions/instructions_DST/instructions_DST.pptx
@@ -5,22 +5,23 @@
     <p:sldMasterId id="2147483672" r:id="rId1"/>
   </p:sldMasterIdLst>
   <p:notesMasterIdLst>
-    <p:notesMasterId r:id="rId15"/>
+    <p:notesMasterId r:id="rId16"/>
   </p:notesMasterIdLst>
   <p:sldIdLst>
     <p:sldId id="507" r:id="rId2"/>
     <p:sldId id="522" r:id="rId3"/>
-    <p:sldId id="571" r:id="rId4"/>
-    <p:sldId id="548" r:id="rId5"/>
-    <p:sldId id="549" r:id="rId6"/>
-    <p:sldId id="557" r:id="rId7"/>
-    <p:sldId id="570" r:id="rId8"/>
-    <p:sldId id="511" r:id="rId9"/>
-    <p:sldId id="558" r:id="rId10"/>
-    <p:sldId id="536" r:id="rId11"/>
-    <p:sldId id="559" r:id="rId12"/>
-    <p:sldId id="560" r:id="rId13"/>
-    <p:sldId id="517" r:id="rId14"/>
+    <p:sldId id="548" r:id="rId4"/>
+    <p:sldId id="549" r:id="rId5"/>
+    <p:sldId id="557" r:id="rId6"/>
+    <p:sldId id="570" r:id="rId7"/>
+    <p:sldId id="511" r:id="rId8"/>
+    <p:sldId id="558" r:id="rId9"/>
+    <p:sldId id="536" r:id="rId10"/>
+    <p:sldId id="559" r:id="rId11"/>
+    <p:sldId id="560" r:id="rId12"/>
+    <p:sldId id="563" r:id="rId13"/>
+    <p:sldId id="566" r:id="rId14"/>
+    <p:sldId id="517" r:id="rId15"/>
   </p:sldIdLst>
   <p:sldSz cx="9144000" cy="6400800"/>
   <p:notesSz cx="6858000" cy="9144000"/>
@@ -209,7 +210,7 @@
           <a:p>
             <a:fld id="{2CC4CF8D-9FFA-D94E-9ECF-51D1F1CD8AD5}" type="datetimeFigureOut">
               <a:rPr lang="en-US" smtClean="0"/>
-              <a:t>4/27/21</a:t>
+              <a:t>7/16/2020</a:t>
             </a:fld>
             <a:endParaRPr lang="en-US"/>
           </a:p>
@@ -644,7 +645,7 @@
     </p:spTree>
     <p:extLst>
       <p:ext uri="{BB962C8B-B14F-4D97-AF65-F5344CB8AC3E}">
-        <p14:creationId xmlns:p14="http://schemas.microsoft.com/office/powerpoint/2010/main" val="1524891351"/>
+        <p14:creationId xmlns:p14="http://schemas.microsoft.com/office/powerpoint/2010/main" val="2871391269"/>
       </p:ext>
     </p:extLst>
   </p:cSld>
@@ -733,7 +734,7 @@
     </p:spTree>
     <p:extLst>
       <p:ext uri="{BB962C8B-B14F-4D97-AF65-F5344CB8AC3E}">
-        <p14:creationId xmlns:p14="http://schemas.microsoft.com/office/powerpoint/2010/main" val="2871391269"/>
+        <p14:creationId xmlns:p14="http://schemas.microsoft.com/office/powerpoint/2010/main" val="4002072085"/>
       </p:ext>
     </p:extLst>
   </p:cSld>
@@ -822,7 +823,7 @@
     </p:spTree>
     <p:extLst>
       <p:ext uri="{BB962C8B-B14F-4D97-AF65-F5344CB8AC3E}">
-        <p14:creationId xmlns:p14="http://schemas.microsoft.com/office/powerpoint/2010/main" val="4002072085"/>
+        <p14:creationId xmlns:p14="http://schemas.microsoft.com/office/powerpoint/2010/main" val="3379377544"/>
       </p:ext>
     </p:extLst>
   </p:cSld>
@@ -903,6 +904,95 @@
             <a:fld id="{68531DAD-A0BF-0641-8A4B-8DD2D329389E}" type="slidenum">
               <a:rPr lang="en-US" smtClean="0"/>
               <a:t>13</a:t>
+            </a:fld>
+            <a:endParaRPr lang="en-US"/>
+          </a:p>
+        </p:txBody>
+      </p:sp>
+    </p:spTree>
+    <p:extLst>
+      <p:ext uri="{BB962C8B-B14F-4D97-AF65-F5344CB8AC3E}">
+        <p14:creationId xmlns:p14="http://schemas.microsoft.com/office/powerpoint/2010/main" val="137713871"/>
+      </p:ext>
+    </p:extLst>
+  </p:cSld>
+  <p:clrMapOvr>
+    <a:masterClrMapping/>
+  </p:clrMapOvr>
+</p:notes>
+</file>
+
+<file path=ppt/notesSlides/notesSlide14.xml><?xml version="1.0" encoding="utf-8"?>
+<p:notes xmlns:a="http://schemas.openxmlformats.org/drawingml/2006/main" xmlns:r="http://schemas.openxmlformats.org/officeDocument/2006/relationships" xmlns:p="http://schemas.openxmlformats.org/presentationml/2006/main">
+  <p:cSld>
+    <p:spTree>
+      <p:nvGrpSpPr>
+        <p:cNvPr id="1" name=""/>
+        <p:cNvGrpSpPr/>
+        <p:nvPr/>
+      </p:nvGrpSpPr>
+      <p:grpSpPr>
+        <a:xfrm>
+          <a:off x="0" y="0"/>
+          <a:ext cx="0" cy="0"/>
+          <a:chOff x="0" y="0"/>
+          <a:chExt cx="0" cy="0"/>
+        </a:xfrm>
+      </p:grpSpPr>
+      <p:sp>
+        <p:nvSpPr>
+          <p:cNvPr id="2" name="Slide Image Placeholder 1"/>
+          <p:cNvSpPr>
+            <a:spLocks noGrp="1" noRot="1" noChangeAspect="1"/>
+          </p:cNvSpPr>
+          <p:nvPr>
+            <p:ph type="sldImg"/>
+          </p:nvPr>
+        </p:nvSpPr>
+        <p:spPr>
+          <a:xfrm>
+            <a:off x="1225550" y="1143000"/>
+            <a:ext cx="4406900" cy="3086100"/>
+          </a:xfrm>
+        </p:spPr>
+      </p:sp>
+      <p:sp>
+        <p:nvSpPr>
+          <p:cNvPr id="3" name="Notes Placeholder 2"/>
+          <p:cNvSpPr>
+            <a:spLocks noGrp="1"/>
+          </p:cNvSpPr>
+          <p:nvPr>
+            <p:ph type="body" idx="1"/>
+          </p:nvPr>
+        </p:nvSpPr>
+        <p:spPr/>
+        <p:txBody>
+          <a:bodyPr/>
+          <a:lstStyle/>
+          <a:p>
+            <a:endParaRPr lang="en-US"/>
+          </a:p>
+        </p:txBody>
+      </p:sp>
+      <p:sp>
+        <p:nvSpPr>
+          <p:cNvPr id="4" name="Slide Number Placeholder 3"/>
+          <p:cNvSpPr>
+            <a:spLocks noGrp="1"/>
+          </p:cNvSpPr>
+          <p:nvPr>
+            <p:ph type="sldNum" sz="quarter" idx="5"/>
+          </p:nvPr>
+        </p:nvSpPr>
+        <p:spPr/>
+        <p:txBody>
+          <a:bodyPr/>
+          <a:lstStyle/>
+          <a:p>
+            <a:fld id="{68531DAD-A0BF-0641-8A4B-8DD2D329389E}" type="slidenum">
+              <a:rPr lang="en-US" smtClean="0"/>
+              <a:t>14</a:t>
             </a:fld>
             <a:endParaRPr lang="en-US"/>
           </a:p>
@@ -1089,7 +1179,7 @@
     </p:spTree>
     <p:extLst>
       <p:ext uri="{BB962C8B-B14F-4D97-AF65-F5344CB8AC3E}">
-        <p14:creationId xmlns:p14="http://schemas.microsoft.com/office/powerpoint/2010/main" val="719414041"/>
+        <p14:creationId xmlns:p14="http://schemas.microsoft.com/office/powerpoint/2010/main" val="1324109028"/>
       </p:ext>
     </p:extLst>
   </p:cSld>
@@ -1178,7 +1268,7 @@
     </p:spTree>
     <p:extLst>
       <p:ext uri="{BB962C8B-B14F-4D97-AF65-F5344CB8AC3E}">
-        <p14:creationId xmlns:p14="http://schemas.microsoft.com/office/powerpoint/2010/main" val="1324109028"/>
+        <p14:creationId xmlns:p14="http://schemas.microsoft.com/office/powerpoint/2010/main" val="3960709445"/>
       </p:ext>
     </p:extLst>
   </p:cSld>
@@ -1267,7 +1357,7 @@
     </p:spTree>
     <p:extLst>
       <p:ext uri="{BB962C8B-B14F-4D97-AF65-F5344CB8AC3E}">
-        <p14:creationId xmlns:p14="http://schemas.microsoft.com/office/powerpoint/2010/main" val="3960709445"/>
+        <p14:creationId xmlns:p14="http://schemas.microsoft.com/office/powerpoint/2010/main" val="4198591555"/>
       </p:ext>
     </p:extLst>
   </p:cSld>
@@ -1356,7 +1446,7 @@
     </p:spTree>
     <p:extLst>
       <p:ext uri="{BB962C8B-B14F-4D97-AF65-F5344CB8AC3E}">
-        <p14:creationId xmlns:p14="http://schemas.microsoft.com/office/powerpoint/2010/main" val="4198591555"/>
+        <p14:creationId xmlns:p14="http://schemas.microsoft.com/office/powerpoint/2010/main" val="1766798222"/>
       </p:ext>
     </p:extLst>
   </p:cSld>
@@ -1445,7 +1535,7 @@
     </p:spTree>
     <p:extLst>
       <p:ext uri="{BB962C8B-B14F-4D97-AF65-F5344CB8AC3E}">
-        <p14:creationId xmlns:p14="http://schemas.microsoft.com/office/powerpoint/2010/main" val="1766798222"/>
+        <p14:creationId xmlns:p14="http://schemas.microsoft.com/office/powerpoint/2010/main" val="1439399412"/>
       </p:ext>
     </p:extLst>
   </p:cSld>
@@ -1534,7 +1624,7 @@
     </p:spTree>
     <p:extLst>
       <p:ext uri="{BB962C8B-B14F-4D97-AF65-F5344CB8AC3E}">
-        <p14:creationId xmlns:p14="http://schemas.microsoft.com/office/powerpoint/2010/main" val="1439399412"/>
+        <p14:creationId xmlns:p14="http://schemas.microsoft.com/office/powerpoint/2010/main" val="149628788"/>
       </p:ext>
     </p:extLst>
   </p:cSld>
@@ -1623,7 +1713,7 @@
     </p:spTree>
     <p:extLst>
       <p:ext uri="{BB962C8B-B14F-4D97-AF65-F5344CB8AC3E}">
-        <p14:creationId xmlns:p14="http://schemas.microsoft.com/office/powerpoint/2010/main" val="149628788"/>
+        <p14:creationId xmlns:p14="http://schemas.microsoft.com/office/powerpoint/2010/main" val="1524891351"/>
       </p:ext>
     </p:extLst>
   </p:cSld>
@@ -1764,7 +1854,7 @@
           <a:p>
             <a:fld id="{2F4D30B7-9F9A-4DF0-96B1-87E6F384AC6E}" type="datetimeFigureOut">
               <a:rPr lang="nl-NL" smtClean="0"/>
-              <a:t>27-04-2021</a:t>
+              <a:t>16-7-2020</a:t>
             </a:fld>
             <a:endParaRPr lang="nl-NL"/>
           </a:p>
@@ -1934,7 +2024,7 @@
           <a:p>
             <a:fld id="{2F4D30B7-9F9A-4DF0-96B1-87E6F384AC6E}" type="datetimeFigureOut">
               <a:rPr lang="nl-NL" smtClean="0"/>
-              <a:t>27-04-2021</a:t>
+              <a:t>16-7-2020</a:t>
             </a:fld>
             <a:endParaRPr lang="nl-NL"/>
           </a:p>
@@ -2114,7 +2204,7 @@
           <a:p>
             <a:fld id="{2F4D30B7-9F9A-4DF0-96B1-87E6F384AC6E}" type="datetimeFigureOut">
               <a:rPr lang="nl-NL" smtClean="0"/>
-              <a:t>27-04-2021</a:t>
+              <a:t>16-7-2020</a:t>
             </a:fld>
             <a:endParaRPr lang="nl-NL"/>
           </a:p>
@@ -2284,7 +2374,7 @@
           <a:p>
             <a:fld id="{2F4D30B7-9F9A-4DF0-96B1-87E6F384AC6E}" type="datetimeFigureOut">
               <a:rPr lang="nl-NL" smtClean="0"/>
-              <a:t>27-04-2021</a:t>
+              <a:t>16-7-2020</a:t>
             </a:fld>
             <a:endParaRPr lang="nl-NL"/>
           </a:p>
@@ -2528,7 +2618,7 @@
           <a:p>
             <a:fld id="{2F4D30B7-9F9A-4DF0-96B1-87E6F384AC6E}" type="datetimeFigureOut">
               <a:rPr lang="nl-NL" smtClean="0"/>
-              <a:t>27-04-2021</a:t>
+              <a:t>16-7-2020</a:t>
             </a:fld>
             <a:endParaRPr lang="nl-NL"/>
           </a:p>
@@ -2760,7 +2850,7 @@
           <a:p>
             <a:fld id="{2F4D30B7-9F9A-4DF0-96B1-87E6F384AC6E}" type="datetimeFigureOut">
               <a:rPr lang="nl-NL" smtClean="0"/>
-              <a:t>27-04-2021</a:t>
+              <a:t>16-7-2020</a:t>
             </a:fld>
             <a:endParaRPr lang="nl-NL"/>
           </a:p>
@@ -3127,7 +3217,7 @@
           <a:p>
             <a:fld id="{2F4D30B7-9F9A-4DF0-96B1-87E6F384AC6E}" type="datetimeFigureOut">
               <a:rPr lang="nl-NL" smtClean="0"/>
-              <a:t>27-04-2021</a:t>
+              <a:t>16-7-2020</a:t>
             </a:fld>
             <a:endParaRPr lang="nl-NL"/>
           </a:p>
@@ -3245,7 +3335,7 @@
           <a:p>
             <a:fld id="{2F4D30B7-9F9A-4DF0-96B1-87E6F384AC6E}" type="datetimeFigureOut">
               <a:rPr lang="nl-NL" smtClean="0"/>
-              <a:t>27-04-2021</a:t>
+              <a:t>16-7-2020</a:t>
             </a:fld>
             <a:endParaRPr lang="nl-NL"/>
           </a:p>
@@ -3340,7 +3430,7 @@
           <a:p>
             <a:fld id="{2F4D30B7-9F9A-4DF0-96B1-87E6F384AC6E}" type="datetimeFigureOut">
               <a:rPr lang="nl-NL" smtClean="0"/>
-              <a:t>27-04-2021</a:t>
+              <a:t>16-7-2020</a:t>
             </a:fld>
             <a:endParaRPr lang="nl-NL"/>
           </a:p>
@@ -3617,7 +3707,7 @@
           <a:p>
             <a:fld id="{2F4D30B7-9F9A-4DF0-96B1-87E6F384AC6E}" type="datetimeFigureOut">
               <a:rPr lang="nl-NL" smtClean="0"/>
-              <a:t>27-04-2021</a:t>
+              <a:t>16-7-2020</a:t>
             </a:fld>
             <a:endParaRPr lang="nl-NL"/>
           </a:p>
@@ -3874,7 +3964,7 @@
           <a:p>
             <a:fld id="{2F4D30B7-9F9A-4DF0-96B1-87E6F384AC6E}" type="datetimeFigureOut">
               <a:rPr lang="nl-NL" smtClean="0"/>
-              <a:t>27-04-2021</a:t>
+              <a:t>16-7-2020</a:t>
             </a:fld>
             <a:endParaRPr lang="nl-NL"/>
           </a:p>
@@ -4087,7 +4177,7 @@
           <a:p>
             <a:fld id="{2F4D30B7-9F9A-4DF0-96B1-87E6F384AC6E}" type="datetimeFigureOut">
               <a:rPr lang="nl-NL" smtClean="0"/>
-              <a:t>27-04-2021</a:t>
+              <a:t>16-7-2020</a:t>
             </a:fld>
             <a:endParaRPr lang="nl-NL"/>
           </a:p>
@@ -4677,7 +4767,7 @@
         <p:spPr>
           <a:xfrm>
             <a:off x="823491" y="1387596"/>
-            <a:ext cx="5603137" cy="4013406"/>
+            <a:ext cx="8375050" cy="5435334"/>
           </a:xfrm>
           <a:prstGeom prst="rect">
             <a:avLst/>
@@ -4692,51 +4782,475 @@
           <a:p>
             <a:r>
               <a:rPr lang="en-US" sz="1960" dirty="0"/>
-              <a:t>Here are a few more things you should keep in mind: </a:t>
-            </a:r>
-          </a:p>
-          <a:p>
-            <a:endParaRPr lang="en-US" sz="1960" dirty="0"/>
-          </a:p>
-          <a:p>
-            <a:endParaRPr lang="en-US" sz="1960" dirty="0"/>
-          </a:p>
-          <a:p>
-            <a:endParaRPr lang="en-US" sz="1960" dirty="0"/>
-          </a:p>
-          <a:p>
-            <a:endParaRPr lang="en-US" sz="1960" dirty="0"/>
-          </a:p>
-          <a:p>
-            <a:endParaRPr lang="en-US" sz="1960" dirty="0"/>
-          </a:p>
-          <a:p>
-            <a:endParaRPr lang="en-US" sz="1960" dirty="0"/>
-          </a:p>
-          <a:p>
-            <a:endParaRPr lang="en-US" sz="1960" dirty="0"/>
-          </a:p>
-          <a:p>
-            <a:endParaRPr lang="en-US" sz="1960" dirty="0"/>
-          </a:p>
-          <a:p>
-            <a:endParaRPr lang="en-US" sz="1960" dirty="0"/>
-          </a:p>
-          <a:p>
-            <a:endParaRPr lang="en-US" sz="1960" dirty="0"/>
-          </a:p>
-          <a:p>
-            <a:endParaRPr lang="en-US" sz="1960" dirty="0"/>
-          </a:p>
-          <a:p>
-            <a:endParaRPr lang="en-US" sz="1960" dirty="0"/>
+              <a:t>Please make a batch choice in under 7 seconds. If you do not make a choice, </a:t>
+            </a:r>
+          </a:p>
+          <a:p>
+            <a:endParaRPr lang="en-US" sz="1960" dirty="0"/>
+          </a:p>
+          <a:p>
+            <a:r>
+              <a:rPr lang="en-US" sz="1960" dirty="0"/>
+              <a:t>the computer will automatically make one for you and you will see this message:</a:t>
+            </a:r>
+          </a:p>
+          <a:p>
+            <a:endParaRPr lang="en-US" sz="1960" dirty="0"/>
+          </a:p>
+          <a:p>
+            <a:endParaRPr lang="en-US" sz="1960" dirty="0"/>
+          </a:p>
+          <a:p>
+            <a:endParaRPr lang="en-US" sz="1960" dirty="0"/>
+          </a:p>
+          <a:p>
+            <a:endParaRPr lang="en-US" sz="1960" dirty="0"/>
+          </a:p>
+          <a:p>
+            <a:endParaRPr lang="en-US" sz="1960" dirty="0"/>
+          </a:p>
+          <a:p>
+            <a:endParaRPr lang="en-US" sz="1960" dirty="0"/>
+          </a:p>
+          <a:p>
+            <a:endParaRPr lang="en-US" sz="1960" dirty="0"/>
+          </a:p>
+          <a:p>
+            <a:endParaRPr lang="en-US" sz="1960" dirty="0"/>
+          </a:p>
+          <a:p>
+            <a:endParaRPr lang="en-US" sz="1960" dirty="0"/>
+          </a:p>
+          <a:p>
+            <a:pPr algn="ctr"/>
+            <a:endParaRPr lang="en-US" sz="1960" dirty="0"/>
+          </a:p>
+          <a:p>
+            <a:pPr algn="ctr"/>
+            <a:endParaRPr lang="en-US" sz="4620" dirty="0"/>
+          </a:p>
+          <a:p>
+            <a:pPr algn="ctr"/>
+            <a:endParaRPr lang="en-US" sz="4620" dirty="0"/>
+          </a:p>
+        </p:txBody>
+      </p:sp>
+      <p:sp>
+        <p:nvSpPr>
+          <p:cNvPr id="6" name="Tekstvak 5">
+            <a:extLst>
+              <a:ext uri="{FF2B5EF4-FFF2-40B4-BE49-F238E27FC236}">
+                <a16:creationId xmlns:a16="http://schemas.microsoft.com/office/drawing/2014/main" id="{A7D3FBCB-F6A3-4FA7-A179-58C1665B6DFD}"/>
+              </a:ext>
+            </a:extLst>
+          </p:cNvPr>
+          <p:cNvSpPr txBox="1"/>
+          <p:nvPr/>
+        </p:nvSpPr>
+        <p:spPr>
+          <a:xfrm>
+            <a:off x="2127358" y="2510291"/>
+            <a:ext cx="4889283" cy="2914644"/>
+          </a:xfrm>
+          <a:prstGeom prst="rect">
+            <a:avLst/>
+          </a:prstGeom>
+          <a:solidFill>
+            <a:schemeClr val="bg1"/>
+          </a:solidFill>
+        </p:spPr>
+        <p:txBody>
+          <a:bodyPr wrap="square" rtlCol="0">
+            <a:spAutoFit/>
+          </a:bodyPr>
+          <a:lstStyle/>
+          <a:p>
+            <a:pPr algn="ctr"/>
+            <a:endParaRPr lang="en-US" sz="1960" dirty="0"/>
+          </a:p>
+          <a:p>
+            <a:pPr algn="ctr"/>
+            <a:endParaRPr lang="en-US" sz="1960" dirty="0"/>
+          </a:p>
+          <a:p>
+            <a:pPr algn="ctr"/>
+            <a:endParaRPr lang="en-US" sz="1960" dirty="0"/>
+          </a:p>
+          <a:p>
+            <a:pPr algn="ctr"/>
+            <a:r>
+              <a:rPr lang="en-US" sz="4620" dirty="0">
+                <a:solidFill>
+                  <a:schemeClr val="bg1"/>
+                </a:solidFill>
+              </a:rPr>
+              <a:t>+</a:t>
+            </a:r>
+          </a:p>
+          <a:p>
+            <a:pPr algn="ctr"/>
+            <a:endParaRPr lang="en-US" sz="1960" dirty="0"/>
+          </a:p>
+          <a:p>
+            <a:endParaRPr lang="en-US" sz="1960" dirty="0"/>
+          </a:p>
+          <a:p>
+            <a:r>
+              <a:rPr lang="en-US" sz="1960" dirty="0"/>
+              <a:t> </a:t>
+            </a:r>
+          </a:p>
+          <a:p>
+            <a:endParaRPr lang="en-US" sz="1960" dirty="0"/>
+          </a:p>
+        </p:txBody>
+      </p:sp>
+      <p:sp>
+        <p:nvSpPr>
+          <p:cNvPr id="2" name="TextBox 1">
+            <a:extLst>
+              <a:ext uri="{FF2B5EF4-FFF2-40B4-BE49-F238E27FC236}">
+                <a16:creationId xmlns:a16="http://schemas.microsoft.com/office/drawing/2014/main" id="{9BE1A097-B149-473D-BCFA-CEB1A3106FD2}"/>
+              </a:ext>
+            </a:extLst>
+          </p:cNvPr>
+          <p:cNvSpPr txBox="1"/>
+          <p:nvPr/>
+        </p:nvSpPr>
+        <p:spPr>
+          <a:xfrm>
+            <a:off x="2439699" y="3602749"/>
+            <a:ext cx="1560220" cy="769441"/>
+          </a:xfrm>
+          <a:prstGeom prst="rect">
+            <a:avLst/>
+          </a:prstGeom>
+          <a:noFill/>
+          <a:ln w="31750">
+            <a:solidFill>
+              <a:schemeClr val="tx1"/>
+            </a:solidFill>
+          </a:ln>
+        </p:spPr>
+        <p:txBody>
+          <a:bodyPr wrap="square" rtlCol="0">
+            <a:spAutoFit/>
+          </a:bodyPr>
+          <a:lstStyle/>
+          <a:p>
+            <a:pPr algn="ctr"/>
+            <a:endParaRPr lang="en-US" sz="800" dirty="0"/>
+          </a:p>
+          <a:p>
+            <a:pPr algn="ctr"/>
+            <a:r>
+              <a:rPr lang="en-US" sz="1400" dirty="0"/>
+              <a:t>8</a:t>
+            </a:r>
+          </a:p>
+          <a:p>
+            <a:pPr algn="ctr"/>
+            <a:r>
+              <a:rPr lang="en-US" sz="1400" b="1" dirty="0">
+                <a:solidFill>
+                  <a:srgbClr val="1B1CD7"/>
+                </a:solidFill>
+              </a:rPr>
+              <a:t>matching</a:t>
+            </a:r>
+            <a:endParaRPr lang="en-US" sz="1400" b="1" dirty="0">
+              <a:solidFill>
+                <a:srgbClr val="F8A60F"/>
+              </a:solidFill>
+            </a:endParaRPr>
+          </a:p>
+          <a:p>
+            <a:pPr algn="ctr"/>
+            <a:endParaRPr lang="en-US" sz="800" dirty="0">
+              <a:solidFill>
+                <a:srgbClr val="F8A60F"/>
+              </a:solidFill>
+            </a:endParaRPr>
+          </a:p>
+        </p:txBody>
+      </p:sp>
+      <p:sp>
+        <p:nvSpPr>
+          <p:cNvPr id="7" name="TextBox 6">
+            <a:extLst>
+              <a:ext uri="{FF2B5EF4-FFF2-40B4-BE49-F238E27FC236}">
+                <a16:creationId xmlns:a16="http://schemas.microsoft.com/office/drawing/2014/main" id="{011136B3-76D7-48E2-A086-F50791BBCE5A}"/>
+              </a:ext>
+            </a:extLst>
+          </p:cNvPr>
+          <p:cNvSpPr txBox="1"/>
+          <p:nvPr/>
+        </p:nvSpPr>
+        <p:spPr>
+          <a:xfrm>
+            <a:off x="5144083" y="3582892"/>
+            <a:ext cx="1560220" cy="769441"/>
+          </a:xfrm>
+          <a:prstGeom prst="rect">
+            <a:avLst/>
+          </a:prstGeom>
+          <a:noFill/>
+          <a:ln w="31750">
+            <a:solidFill>
+              <a:srgbClr val="00AB36"/>
+            </a:solidFill>
+          </a:ln>
+        </p:spPr>
+        <p:txBody>
+          <a:bodyPr wrap="square" rtlCol="0">
+            <a:spAutoFit/>
+          </a:bodyPr>
+          <a:lstStyle/>
+          <a:p>
+            <a:pPr algn="ctr"/>
+            <a:endParaRPr lang="en-US" sz="800" dirty="0"/>
+          </a:p>
+          <a:p>
+            <a:pPr algn="ctr"/>
+            <a:r>
+              <a:rPr lang="en-US" sz="1400" dirty="0"/>
+              <a:t>4</a:t>
+            </a:r>
+          </a:p>
+          <a:p>
+            <a:pPr algn="ctr"/>
+            <a:r>
+              <a:rPr lang="en-US" sz="1400" b="1" dirty="0">
+                <a:solidFill>
+                  <a:srgbClr val="F8A60F"/>
+                </a:solidFill>
+              </a:rPr>
+              <a:t>mismatching</a:t>
+            </a:r>
+            <a:endParaRPr lang="en-US" sz="1400" b="1" dirty="0">
+              <a:solidFill>
+                <a:srgbClr val="1B1CD7"/>
+              </a:solidFill>
+            </a:endParaRPr>
+          </a:p>
+          <a:p>
+            <a:pPr algn="ctr"/>
+            <a:endParaRPr lang="en-US" sz="800" dirty="0">
+              <a:solidFill>
+                <a:srgbClr val="F8A60F"/>
+              </a:solidFill>
+            </a:endParaRPr>
+          </a:p>
+        </p:txBody>
+      </p:sp>
+      <p:sp>
+        <p:nvSpPr>
+          <p:cNvPr id="4" name="TextBox 3">
+            <a:extLst>
+              <a:ext uri="{FF2B5EF4-FFF2-40B4-BE49-F238E27FC236}">
+                <a16:creationId xmlns:a16="http://schemas.microsoft.com/office/drawing/2014/main" id="{F9A30FC6-95B9-4A60-B131-2E6F9192A7CD}"/>
+              </a:ext>
+            </a:extLst>
+          </p:cNvPr>
+          <p:cNvSpPr txBox="1"/>
+          <p:nvPr/>
+        </p:nvSpPr>
+        <p:spPr>
+          <a:xfrm>
+            <a:off x="4312260" y="3547723"/>
+            <a:ext cx="914400" cy="1077218"/>
+          </a:xfrm>
+          <a:prstGeom prst="rect">
+            <a:avLst/>
+          </a:prstGeom>
+          <a:noFill/>
+        </p:spPr>
+        <p:txBody>
+          <a:bodyPr wrap="square" rtlCol="0">
+            <a:spAutoFit/>
+          </a:bodyPr>
+          <a:lstStyle/>
+          <a:p>
+            <a:r>
+              <a:rPr lang="en-US" sz="4600" dirty="0"/>
+              <a:t>+</a:t>
+            </a:r>
+          </a:p>
+          <a:p>
+            <a:endParaRPr lang="en-US" dirty="0"/>
+          </a:p>
+        </p:txBody>
+      </p:sp>
+      <p:sp>
+        <p:nvSpPr>
+          <p:cNvPr id="8" name="TextBox 7">
+            <a:extLst>
+              <a:ext uri="{FF2B5EF4-FFF2-40B4-BE49-F238E27FC236}">
+                <a16:creationId xmlns:a16="http://schemas.microsoft.com/office/drawing/2014/main" id="{176BCA7B-DF07-434D-B61E-1D85D7125009}"/>
+              </a:ext>
+            </a:extLst>
+          </p:cNvPr>
+          <p:cNvSpPr txBox="1"/>
+          <p:nvPr/>
+        </p:nvSpPr>
+        <p:spPr>
+          <a:xfrm>
+            <a:off x="4114800" y="3217984"/>
+            <a:ext cx="914400" cy="914400"/>
+          </a:xfrm>
+          <a:prstGeom prst="rect">
+            <a:avLst/>
+          </a:prstGeom>
+          <a:noFill/>
+        </p:spPr>
+        <p:txBody>
+          <a:bodyPr wrap="square" rtlCol="0">
+            <a:spAutoFit/>
+          </a:bodyPr>
+          <a:lstStyle/>
+          <a:p>
+            <a:endParaRPr lang="en-US" dirty="0"/>
+          </a:p>
+        </p:txBody>
+      </p:sp>
+      <p:sp>
+        <p:nvSpPr>
+          <p:cNvPr id="9" name="TextBox 8">
+            <a:extLst>
+              <a:ext uri="{FF2B5EF4-FFF2-40B4-BE49-F238E27FC236}">
+                <a16:creationId xmlns:a16="http://schemas.microsoft.com/office/drawing/2014/main" id="{09BA4E5D-4B17-4FB7-AAF1-0DBE8CCCFD80}"/>
+              </a:ext>
+            </a:extLst>
+          </p:cNvPr>
+          <p:cNvSpPr txBox="1"/>
+          <p:nvPr/>
+        </p:nvSpPr>
+        <p:spPr>
+          <a:xfrm>
+            <a:off x="4114800" y="3217984"/>
+            <a:ext cx="914400" cy="914400"/>
+          </a:xfrm>
+          <a:prstGeom prst="rect">
+            <a:avLst/>
+          </a:prstGeom>
+          <a:noFill/>
+        </p:spPr>
+        <p:txBody>
+          <a:bodyPr wrap="square" rtlCol="0">
+            <a:spAutoFit/>
+          </a:bodyPr>
+          <a:lstStyle/>
+          <a:p>
+            <a:endParaRPr lang="en-US" dirty="0"/>
+          </a:p>
+        </p:txBody>
+      </p:sp>
+      <p:pic>
+        <p:nvPicPr>
+          <p:cNvPr id="10" name="Picture 9">
+            <a:extLst>
+              <a:ext uri="{FF2B5EF4-FFF2-40B4-BE49-F238E27FC236}">
+                <a16:creationId xmlns:a16="http://schemas.microsoft.com/office/drawing/2014/main" id="{BE8F88AE-BFDB-4290-AB1F-68A7983695C2}"/>
+              </a:ext>
+            </a:extLst>
+          </p:cNvPr>
+          <p:cNvPicPr>
+            <a:picLocks noChangeAspect="1"/>
+          </p:cNvPicPr>
+          <p:nvPr/>
+        </p:nvPicPr>
+        <p:blipFill rotWithShape="1">
+          <a:blip r:embed="rId3"/>
+          <a:srcRect l="9006" t="73963" r="73248"/>
+          <a:stretch/>
+        </p:blipFill>
+        <p:spPr>
+          <a:xfrm>
+            <a:off x="2767326" y="4546460"/>
+            <a:ext cx="914400" cy="570636"/>
+          </a:xfrm>
+          <a:prstGeom prst="rect">
+            <a:avLst/>
+          </a:prstGeom>
+        </p:spPr>
+      </p:pic>
+      <p:pic>
+        <p:nvPicPr>
+          <p:cNvPr id="12" name="Picture 11">
+            <a:extLst>
+              <a:ext uri="{FF2B5EF4-FFF2-40B4-BE49-F238E27FC236}">
+                <a16:creationId xmlns:a16="http://schemas.microsoft.com/office/drawing/2014/main" id="{B4C8378F-63AB-4822-9A02-8132F3DE065A}"/>
+              </a:ext>
+            </a:extLst>
+          </p:cNvPr>
+          <p:cNvPicPr>
+            <a:picLocks noChangeAspect="1"/>
+          </p:cNvPicPr>
+          <p:nvPr/>
+        </p:nvPicPr>
+        <p:blipFill rotWithShape="1">
+          <a:blip r:embed="rId3"/>
+          <a:srcRect l="70615" t="73963" r="10154"/>
+          <a:stretch/>
+        </p:blipFill>
+        <p:spPr>
+          <a:xfrm>
+            <a:off x="5361729" y="4540372"/>
+            <a:ext cx="990930" cy="570636"/>
+          </a:xfrm>
+          <a:prstGeom prst="rect">
+            <a:avLst/>
+          </a:prstGeom>
+        </p:spPr>
+      </p:pic>
+      <p:sp>
+        <p:nvSpPr>
+          <p:cNvPr id="5" name="TextBox 4">
+            <a:extLst>
+              <a:ext uri="{FF2B5EF4-FFF2-40B4-BE49-F238E27FC236}">
+                <a16:creationId xmlns:a16="http://schemas.microsoft.com/office/drawing/2014/main" id="{0B0EA942-DCAB-4680-9686-68DAE65DB2DD}"/>
+              </a:ext>
+            </a:extLst>
+          </p:cNvPr>
+          <p:cNvSpPr txBox="1"/>
+          <p:nvPr/>
+        </p:nvSpPr>
+        <p:spPr>
+          <a:xfrm>
+            <a:off x="4114800" y="2554275"/>
+            <a:ext cx="2137298" cy="769441"/>
+          </a:xfrm>
+          <a:prstGeom prst="rect">
+            <a:avLst/>
+          </a:prstGeom>
+          <a:noFill/>
+        </p:spPr>
+        <p:txBody>
+          <a:bodyPr wrap="square">
+            <a:spAutoFit/>
+          </a:bodyPr>
+          <a:lstStyle/>
+          <a:p>
+            <a:r>
+              <a:rPr lang="en-US" sz="1800" dirty="0"/>
+              <a:t>Too slow… </a:t>
+            </a:r>
+            <a:r>
+              <a:rPr lang="en-US" sz="4400" dirty="0">
+                <a:solidFill>
+                  <a:schemeClr val="bg1"/>
+                </a:solidFill>
+              </a:rPr>
+              <a:t>X</a:t>
+            </a:r>
+            <a:endParaRPr lang="en-US" dirty="0"/>
           </a:p>
         </p:txBody>
       </p:sp>
     </p:spTree>
     <p:extLst>
       <p:ext uri="{BB962C8B-B14F-4D97-AF65-F5344CB8AC3E}">
-        <p14:creationId xmlns:p14="http://schemas.microsoft.com/office/powerpoint/2010/main" val="1246903257"/>
+        <p14:creationId xmlns:p14="http://schemas.microsoft.com/office/powerpoint/2010/main" val="127323617"/>
       </p:ext>
     </p:extLst>
   </p:cSld>
@@ -4788,7 +5302,7 @@
         <p:spPr>
           <a:xfrm>
             <a:off x="823491" y="1387596"/>
-            <a:ext cx="8375050" cy="5435334"/>
+            <a:ext cx="6642331" cy="5435334"/>
           </a:xfrm>
           <a:prstGeom prst="rect">
             <a:avLst/>
@@ -4803,24 +5317,16 @@
           <a:p>
             <a:r>
               <a:rPr lang="en-US" sz="1960" dirty="0"/>
-              <a:t>Please make a batch choice in under </a:t>
-            </a:r>
-            <a:r>
-              <a:rPr lang="en-US" altLang="zh-CN" sz="1960" dirty="0"/>
-              <a:t>3</a:t>
-            </a:r>
+              <a:t>Please try your best on each trial. If you make 2 errors in a row, </a:t>
+            </a:r>
+          </a:p>
+          <a:p>
+            <a:endParaRPr lang="en-US" sz="1960" dirty="0"/>
+          </a:p>
+          <a:p>
             <a:r>
               <a:rPr lang="en-US" sz="1960" dirty="0"/>
-              <a:t> seconds. If you do not make a choice, </a:t>
-            </a:r>
-          </a:p>
-          <a:p>
-            <a:endParaRPr lang="en-US" sz="1960" dirty="0"/>
-          </a:p>
-          <a:p>
-            <a:r>
-              <a:rPr lang="en-US" sz="1960" dirty="0"/>
-              <a:t>the computer will automatically make one for you and you will see this message:</a:t>
+              <a:t>including missing trials, you will see a black dot: </a:t>
             </a:r>
           </a:p>
           <a:p>
@@ -4936,135 +5442,6 @@
       </p:sp>
       <p:sp>
         <p:nvSpPr>
-          <p:cNvPr id="2" name="TextBox 1">
-            <a:extLst>
-              <a:ext uri="{FF2B5EF4-FFF2-40B4-BE49-F238E27FC236}">
-                <a16:creationId xmlns:a16="http://schemas.microsoft.com/office/drawing/2014/main" id="{9BE1A097-B149-473D-BCFA-CEB1A3106FD2}"/>
-              </a:ext>
-            </a:extLst>
-          </p:cNvPr>
-          <p:cNvSpPr txBox="1"/>
-          <p:nvPr/>
-        </p:nvSpPr>
-        <p:spPr>
-          <a:xfrm>
-            <a:off x="2439699" y="3602749"/>
-            <a:ext cx="1560220" cy="769441"/>
-          </a:xfrm>
-          <a:prstGeom prst="rect">
-            <a:avLst/>
-          </a:prstGeom>
-          <a:noFill/>
-          <a:ln w="31750">
-            <a:solidFill>
-              <a:schemeClr val="tx1"/>
-            </a:solidFill>
-          </a:ln>
-        </p:spPr>
-        <p:txBody>
-          <a:bodyPr wrap="square" rtlCol="0">
-            <a:spAutoFit/>
-          </a:bodyPr>
-          <a:lstStyle/>
-          <a:p>
-            <a:pPr algn="ctr"/>
-            <a:endParaRPr lang="en-US" sz="800" dirty="0"/>
-          </a:p>
-          <a:p>
-            <a:pPr algn="ctr"/>
-            <a:r>
-              <a:rPr lang="en-US" altLang="zh-CN" sz="1400" dirty="0"/>
-              <a:t>4</a:t>
-            </a:r>
-            <a:endParaRPr lang="en-US" sz="1400" dirty="0"/>
-          </a:p>
-          <a:p>
-            <a:pPr algn="ctr"/>
-            <a:r>
-              <a:rPr lang="en-US" sz="1400" b="1" dirty="0">
-                <a:solidFill>
-                  <a:srgbClr val="F8A60F"/>
-                </a:solidFill>
-              </a:rPr>
-              <a:t>mismatching</a:t>
-            </a:r>
-          </a:p>
-          <a:p>
-            <a:pPr algn="ctr"/>
-            <a:endParaRPr lang="en-US" sz="800" dirty="0">
-              <a:solidFill>
-                <a:srgbClr val="F8A60F"/>
-              </a:solidFill>
-            </a:endParaRPr>
-          </a:p>
-        </p:txBody>
-      </p:sp>
-      <p:sp>
-        <p:nvSpPr>
-          <p:cNvPr id="7" name="TextBox 6">
-            <a:extLst>
-              <a:ext uri="{FF2B5EF4-FFF2-40B4-BE49-F238E27FC236}">
-                <a16:creationId xmlns:a16="http://schemas.microsoft.com/office/drawing/2014/main" id="{011136B3-76D7-48E2-A086-F50791BBCE5A}"/>
-              </a:ext>
-            </a:extLst>
-          </p:cNvPr>
-          <p:cNvSpPr txBox="1"/>
-          <p:nvPr/>
-        </p:nvSpPr>
-        <p:spPr>
-          <a:xfrm>
-            <a:off x="5144083" y="3582892"/>
-            <a:ext cx="1560220" cy="769441"/>
-          </a:xfrm>
-          <a:prstGeom prst="rect">
-            <a:avLst/>
-          </a:prstGeom>
-          <a:noFill/>
-          <a:ln w="31750">
-            <a:solidFill>
-              <a:srgbClr val="00AB36"/>
-            </a:solidFill>
-          </a:ln>
-        </p:spPr>
-        <p:txBody>
-          <a:bodyPr wrap="square" rtlCol="0">
-            <a:spAutoFit/>
-          </a:bodyPr>
-          <a:lstStyle/>
-          <a:p>
-            <a:pPr algn="ctr"/>
-            <a:endParaRPr lang="en-US" sz="800" dirty="0"/>
-          </a:p>
-          <a:p>
-            <a:pPr algn="ctr"/>
-            <a:r>
-              <a:rPr lang="en-US" sz="1400" dirty="0"/>
-              <a:t>4</a:t>
-            </a:r>
-          </a:p>
-          <a:p>
-            <a:pPr algn="ctr"/>
-            <a:r>
-              <a:rPr lang="en-US" sz="1400" b="1" dirty="0">
-                <a:solidFill>
-                  <a:srgbClr val="1B1CD7"/>
-                </a:solidFill>
-              </a:rPr>
-              <a:t>matching</a:t>
-            </a:r>
-          </a:p>
-          <a:p>
-            <a:pPr algn="ctr"/>
-            <a:endParaRPr lang="en-US" sz="800" dirty="0">
-              <a:solidFill>
-                <a:srgbClr val="F8A60F"/>
-              </a:solidFill>
-            </a:endParaRPr>
-          </a:p>
-        </p:txBody>
-      </p:sp>
-      <p:sp>
-        <p:nvSpPr>
           <p:cNvPr id="4" name="TextBox 3">
             <a:extLst>
               <a:ext uri="{FF2B5EF4-FFF2-40B4-BE49-F238E27FC236}">
@@ -5165,104 +5542,48 @@
           </a:p>
         </p:txBody>
       </p:sp>
-      <p:pic>
-        <p:nvPicPr>
-          <p:cNvPr id="10" name="Picture 9">
+      <p:sp>
+        <p:nvSpPr>
+          <p:cNvPr id="5" name="Oval 4">
             <a:extLst>
               <a:ext uri="{FF2B5EF4-FFF2-40B4-BE49-F238E27FC236}">
-                <a16:creationId xmlns:a16="http://schemas.microsoft.com/office/drawing/2014/main" id="{BE8F88AE-BFDB-4290-AB1F-68A7983695C2}"/>
+                <a16:creationId xmlns:a16="http://schemas.microsoft.com/office/drawing/2014/main" id="{D84A053D-1C7B-46C4-8187-933F85A112AB}"/>
               </a:ext>
             </a:extLst>
           </p:cNvPr>
-          <p:cNvPicPr>
-            <a:picLocks noChangeAspect="1"/>
-          </p:cNvPicPr>
+          <p:cNvSpPr/>
           <p:nvPr/>
-        </p:nvPicPr>
-        <p:blipFill rotWithShape="1">
-          <a:blip r:embed="rId3"/>
-          <a:srcRect l="9006" t="73963" r="73248"/>
-          <a:stretch/>
-        </p:blipFill>
-        <p:spPr>
-          <a:xfrm>
-            <a:off x="2767326" y="4546460"/>
-            <a:ext cx="914400" cy="570636"/>
-          </a:xfrm>
-          <a:prstGeom prst="rect">
+        </p:nvSpPr>
+        <p:spPr>
+          <a:xfrm>
+            <a:off x="3833157" y="3283639"/>
+            <a:ext cx="1452283" cy="1371600"/>
+          </a:xfrm>
+          <a:prstGeom prst="ellipse">
             <a:avLst/>
           </a:prstGeom>
         </p:spPr>
-      </p:pic>
-      <p:pic>
-        <p:nvPicPr>
-          <p:cNvPr id="12" name="Picture 11">
-            <a:extLst>
-              <a:ext uri="{FF2B5EF4-FFF2-40B4-BE49-F238E27FC236}">
-                <a16:creationId xmlns:a16="http://schemas.microsoft.com/office/drawing/2014/main" id="{B4C8378F-63AB-4822-9A02-8132F3DE065A}"/>
-              </a:ext>
-            </a:extLst>
-          </p:cNvPr>
-          <p:cNvPicPr>
-            <a:picLocks noChangeAspect="1"/>
-          </p:cNvPicPr>
-          <p:nvPr/>
-        </p:nvPicPr>
-        <p:blipFill rotWithShape="1">
-          <a:blip r:embed="rId3"/>
-          <a:srcRect l="70615" t="73963" r="10154"/>
-          <a:stretch/>
-        </p:blipFill>
-        <p:spPr>
-          <a:xfrm>
-            <a:off x="5361729" y="4540372"/>
-            <a:ext cx="990930" cy="570636"/>
-          </a:xfrm>
-          <a:prstGeom prst="rect">
-            <a:avLst/>
-          </a:prstGeom>
-        </p:spPr>
-      </p:pic>
-      <p:sp>
-        <p:nvSpPr>
-          <p:cNvPr id="5" name="TextBox 4">
-            <a:extLst>
-              <a:ext uri="{FF2B5EF4-FFF2-40B4-BE49-F238E27FC236}">
-                <a16:creationId xmlns:a16="http://schemas.microsoft.com/office/drawing/2014/main" id="{0B0EA942-DCAB-4680-9686-68DAE65DB2DD}"/>
-              </a:ext>
-            </a:extLst>
-          </p:cNvPr>
-          <p:cNvSpPr txBox="1"/>
-          <p:nvPr/>
-        </p:nvSpPr>
-        <p:spPr>
-          <a:xfrm>
-            <a:off x="4114800" y="2554275"/>
-            <a:ext cx="2137298" cy="769441"/>
-          </a:xfrm>
-          <a:prstGeom prst="rect">
-            <a:avLst/>
-          </a:prstGeom>
-          <a:noFill/>
-        </p:spPr>
-        <p:txBody>
-          <a:bodyPr wrap="square">
-            <a:spAutoFit/>
-          </a:bodyPr>
-          <a:lstStyle/>
-          <a:p>
-            <a:r>
-              <a:rPr lang="en-US" sz="1800" dirty="0"/>
-              <a:t>Too slow… </a:t>
-            </a:r>
-            <a:r>
-              <a:rPr lang="en-US" sz="4400" dirty="0">
-                <a:solidFill>
-                  <a:schemeClr val="bg1"/>
-                </a:solidFill>
-              </a:rPr>
-              <a:t>X</a:t>
-            </a:r>
+        <p:style>
+          <a:lnRef idx="2">
+            <a:schemeClr val="dk1">
+              <a:shade val="50000"/>
+            </a:schemeClr>
+          </a:lnRef>
+          <a:fillRef idx="1">
+            <a:schemeClr val="dk1"/>
+          </a:fillRef>
+          <a:effectRef idx="0">
+            <a:schemeClr val="dk1"/>
+          </a:effectRef>
+          <a:fontRef idx="minor">
+            <a:schemeClr val="lt1"/>
+          </a:fontRef>
+        </p:style>
+        <p:txBody>
+          <a:bodyPr rtlCol="0" anchor="ctr"/>
+          <a:lstStyle/>
+          <a:p>
+            <a:pPr algn="ctr"/>
             <a:endParaRPr lang="en-US" dirty="0"/>
           </a:p>
         </p:txBody>
@@ -5270,7 +5591,7 @@
     </p:spTree>
     <p:extLst>
       <p:ext uri="{BB962C8B-B14F-4D97-AF65-F5344CB8AC3E}">
-        <p14:creationId xmlns:p14="http://schemas.microsoft.com/office/powerpoint/2010/main" val="127323617"/>
+        <p14:creationId xmlns:p14="http://schemas.microsoft.com/office/powerpoint/2010/main" val="2587601109"/>
       </p:ext>
     </p:extLst>
   </p:cSld>
@@ -5322,7 +5643,7 @@
         <p:spPr>
           <a:xfrm>
             <a:off x="823491" y="1387596"/>
-            <a:ext cx="6642331" cy="5435334"/>
+            <a:ext cx="8148256" cy="5736955"/>
           </a:xfrm>
           <a:prstGeom prst="rect">
             <a:avLst/>
@@ -5337,17 +5658,23 @@
           <a:p>
             <a:r>
               <a:rPr lang="en-US" sz="1960" dirty="0"/>
-              <a:t>Please try your best on each trial. If you make 2 errors in a row, </a:t>
-            </a:r>
-          </a:p>
-          <a:p>
-            <a:endParaRPr lang="en-US" sz="1960" dirty="0"/>
+              <a:t>If you select the batch with fewer trials, there will be a wait period before </a:t>
+            </a:r>
           </a:p>
           <a:p>
             <a:r>
               <a:rPr lang="en-US" sz="1960" dirty="0"/>
-              <a:t>including missing trials, you will see a black dot: </a:t>
-            </a:r>
+              <a:t>and after the trials. So the game will take the same amount of time regardless </a:t>
+            </a:r>
+          </a:p>
+          <a:p>
+            <a:r>
+              <a:rPr lang="en-US" sz="1960" dirty="0"/>
+              <a:t>of which batch you choose.</a:t>
+            </a:r>
+          </a:p>
+          <a:p>
+            <a:endParaRPr lang="en-US" sz="1960" dirty="0"/>
           </a:p>
           <a:p>
             <a:endParaRPr lang="en-US" sz="1960" dirty="0"/>
@@ -5462,6 +5789,144 @@
       </p:sp>
       <p:sp>
         <p:nvSpPr>
+          <p:cNvPr id="2" name="TextBox 1">
+            <a:extLst>
+              <a:ext uri="{FF2B5EF4-FFF2-40B4-BE49-F238E27FC236}">
+                <a16:creationId xmlns:a16="http://schemas.microsoft.com/office/drawing/2014/main" id="{9BE1A097-B149-473D-BCFA-CEB1A3106FD2}"/>
+              </a:ext>
+            </a:extLst>
+          </p:cNvPr>
+          <p:cNvSpPr txBox="1"/>
+          <p:nvPr/>
+        </p:nvSpPr>
+        <p:spPr>
+          <a:xfrm>
+            <a:off x="2439699" y="3602749"/>
+            <a:ext cx="1560220" cy="769441"/>
+          </a:xfrm>
+          <a:prstGeom prst="rect">
+            <a:avLst/>
+          </a:prstGeom>
+          <a:noFill/>
+          <a:ln w="31750">
+            <a:solidFill>
+              <a:schemeClr val="tx1"/>
+            </a:solidFill>
+          </a:ln>
+        </p:spPr>
+        <p:txBody>
+          <a:bodyPr wrap="square" rtlCol="0">
+            <a:spAutoFit/>
+          </a:bodyPr>
+          <a:lstStyle/>
+          <a:p>
+            <a:pPr algn="ctr"/>
+            <a:endParaRPr lang="en-US" sz="800" dirty="0"/>
+          </a:p>
+          <a:p>
+            <a:pPr algn="ctr"/>
+            <a:r>
+              <a:rPr lang="en-US" sz="1400" dirty="0"/>
+              <a:t>8</a:t>
+            </a:r>
+          </a:p>
+          <a:p>
+            <a:pPr algn="ctr"/>
+            <a:r>
+              <a:rPr lang="en-US" sz="1400" b="1" dirty="0">
+                <a:solidFill>
+                  <a:srgbClr val="1B1CD7"/>
+                </a:solidFill>
+              </a:rPr>
+              <a:t>matching</a:t>
+            </a:r>
+            <a:endParaRPr lang="en-US" sz="1400" b="1" dirty="0">
+              <a:solidFill>
+                <a:srgbClr val="F8A60F"/>
+              </a:solidFill>
+            </a:endParaRPr>
+          </a:p>
+          <a:p>
+            <a:pPr algn="ctr"/>
+            <a:endParaRPr lang="en-US" sz="800" dirty="0">
+              <a:solidFill>
+                <a:srgbClr val="F8A60F"/>
+              </a:solidFill>
+            </a:endParaRPr>
+          </a:p>
+        </p:txBody>
+      </p:sp>
+      <p:sp>
+        <p:nvSpPr>
+          <p:cNvPr id="7" name="TextBox 6">
+            <a:extLst>
+              <a:ext uri="{FF2B5EF4-FFF2-40B4-BE49-F238E27FC236}">
+                <a16:creationId xmlns:a16="http://schemas.microsoft.com/office/drawing/2014/main" id="{011136B3-76D7-48E2-A086-F50791BBCE5A}"/>
+              </a:ext>
+            </a:extLst>
+          </p:cNvPr>
+          <p:cNvSpPr txBox="1"/>
+          <p:nvPr/>
+        </p:nvSpPr>
+        <p:spPr>
+          <a:xfrm>
+            <a:off x="5144083" y="3582892"/>
+            <a:ext cx="1560220" cy="769441"/>
+          </a:xfrm>
+          <a:prstGeom prst="rect">
+            <a:avLst/>
+          </a:prstGeom>
+          <a:noFill/>
+          <a:ln w="31750">
+            <a:solidFill>
+              <a:srgbClr val="00AB36"/>
+            </a:solidFill>
+          </a:ln>
+        </p:spPr>
+        <p:txBody>
+          <a:bodyPr wrap="square" rtlCol="0">
+            <a:spAutoFit/>
+          </a:bodyPr>
+          <a:lstStyle/>
+          <a:p>
+            <a:pPr algn="ctr"/>
+            <a:endParaRPr lang="en-US" sz="800" dirty="0"/>
+          </a:p>
+          <a:p>
+            <a:pPr algn="ctr"/>
+            <a:r>
+              <a:rPr lang="en-US" sz="1400" dirty="0"/>
+              <a:t>4</a:t>
+            </a:r>
+          </a:p>
+          <a:p>
+            <a:pPr algn="ctr"/>
+            <a:r>
+              <a:rPr lang="en-US" sz="1400" b="1" dirty="0">
+                <a:solidFill>
+                  <a:srgbClr val="F8A60F"/>
+                </a:solidFill>
+              </a:rPr>
+              <a:t>mismatching</a:t>
+            </a:r>
+            <a:endParaRPr lang="en-US" sz="1400" b="1" dirty="0">
+              <a:solidFill>
+                <a:srgbClr val="1B1CD7"/>
+              </a:solidFill>
+            </a:endParaRPr>
+          </a:p>
+          <a:p>
+            <a:pPr algn="ctr"/>
+            <a:endParaRPr lang="en-US" sz="800" dirty="0">
+              <a:solidFill>
+                <a:srgbClr val="F8A60F"/>
+              </a:solidFill>
+            </a:endParaRPr>
+          </a:p>
+        </p:txBody>
+      </p:sp>
+      <p:sp>
+        <p:nvSpPr>
           <p:cNvPr id="4" name="TextBox 3">
             <a:extLst>
               <a:ext uri="{FF2B5EF4-FFF2-40B4-BE49-F238E27FC236}">
@@ -5562,56 +6027,68 @@
           </a:p>
         </p:txBody>
       </p:sp>
-      <p:sp>
-        <p:nvSpPr>
-          <p:cNvPr id="5" name="Oval 4">
+      <p:pic>
+        <p:nvPicPr>
+          <p:cNvPr id="10" name="Picture 9">
             <a:extLst>
               <a:ext uri="{FF2B5EF4-FFF2-40B4-BE49-F238E27FC236}">
-                <a16:creationId xmlns:a16="http://schemas.microsoft.com/office/drawing/2014/main" id="{D84A053D-1C7B-46C4-8187-933F85A112AB}"/>
+                <a16:creationId xmlns:a16="http://schemas.microsoft.com/office/drawing/2014/main" id="{BE8F88AE-BFDB-4290-AB1F-68A7983695C2}"/>
               </a:ext>
             </a:extLst>
           </p:cNvPr>
-          <p:cNvSpPr/>
+          <p:cNvPicPr>
+            <a:picLocks noChangeAspect="1"/>
+          </p:cNvPicPr>
           <p:nvPr/>
-        </p:nvSpPr>
-        <p:spPr>
-          <a:xfrm>
-            <a:off x="3833157" y="3283639"/>
-            <a:ext cx="1452283" cy="1371600"/>
-          </a:xfrm>
-          <a:prstGeom prst="ellipse">
+        </p:nvPicPr>
+        <p:blipFill rotWithShape="1">
+          <a:blip r:embed="rId3"/>
+          <a:srcRect l="9006" t="73963" r="73248"/>
+          <a:stretch/>
+        </p:blipFill>
+        <p:spPr>
+          <a:xfrm>
+            <a:off x="2767326" y="4546460"/>
+            <a:ext cx="914400" cy="570636"/>
+          </a:xfrm>
+          <a:prstGeom prst="rect">
             <a:avLst/>
           </a:prstGeom>
         </p:spPr>
-        <p:style>
-          <a:lnRef idx="2">
-            <a:schemeClr val="dk1">
-              <a:shade val="50000"/>
-            </a:schemeClr>
-          </a:lnRef>
-          <a:fillRef idx="1">
-            <a:schemeClr val="dk1"/>
-          </a:fillRef>
-          <a:effectRef idx="0">
-            <a:schemeClr val="dk1"/>
-          </a:effectRef>
-          <a:fontRef idx="minor">
-            <a:schemeClr val="lt1"/>
-          </a:fontRef>
-        </p:style>
-        <p:txBody>
-          <a:bodyPr rtlCol="0" anchor="ctr"/>
-          <a:lstStyle/>
-          <a:p>
-            <a:pPr algn="ctr"/>
-            <a:endParaRPr lang="en-US" dirty="0"/>
-          </a:p>
-        </p:txBody>
-      </p:sp>
+      </p:pic>
+      <p:pic>
+        <p:nvPicPr>
+          <p:cNvPr id="12" name="Picture 11">
+            <a:extLst>
+              <a:ext uri="{FF2B5EF4-FFF2-40B4-BE49-F238E27FC236}">
+                <a16:creationId xmlns:a16="http://schemas.microsoft.com/office/drawing/2014/main" id="{B4C8378F-63AB-4822-9A02-8132F3DE065A}"/>
+              </a:ext>
+            </a:extLst>
+          </p:cNvPr>
+          <p:cNvPicPr>
+            <a:picLocks noChangeAspect="1"/>
+          </p:cNvPicPr>
+          <p:nvPr/>
+        </p:nvPicPr>
+        <p:blipFill rotWithShape="1">
+          <a:blip r:embed="rId3"/>
+          <a:srcRect l="70615" t="73963" r="10154"/>
+          <a:stretch/>
+        </p:blipFill>
+        <p:spPr>
+          <a:xfrm>
+            <a:off x="5361729" y="4540372"/>
+            <a:ext cx="990930" cy="570636"/>
+          </a:xfrm>
+          <a:prstGeom prst="rect">
+            <a:avLst/>
+          </a:prstGeom>
+        </p:spPr>
+      </p:pic>
     </p:spTree>
     <p:extLst>
       <p:ext uri="{BB962C8B-B14F-4D97-AF65-F5344CB8AC3E}">
-        <p14:creationId xmlns:p14="http://schemas.microsoft.com/office/powerpoint/2010/main" val="2587601109"/>
+        <p14:creationId xmlns:p14="http://schemas.microsoft.com/office/powerpoint/2010/main" val="3733992603"/>
       </p:ext>
     </p:extLst>
   </p:cSld>
@@ -5622,6 +6099,275 @@
 </file>
 
 <file path=ppt/slides/slide13.xml><?xml version="1.0" encoding="utf-8"?>
+<p:sld xmlns:a="http://schemas.openxmlformats.org/drawingml/2006/main" xmlns:r="http://schemas.openxmlformats.org/officeDocument/2006/relationships" xmlns:p="http://schemas.openxmlformats.org/presentationml/2006/main">
+  <p:cSld>
+    <p:bg>
+      <p:bgPr>
+        <a:solidFill>
+          <a:schemeClr val="bg2">
+            <a:lumMod val="75000"/>
+          </a:schemeClr>
+        </a:solidFill>
+        <a:effectLst/>
+      </p:bgPr>
+    </p:bg>
+    <p:spTree>
+      <p:nvGrpSpPr>
+        <p:cNvPr id="1" name=""/>
+        <p:cNvGrpSpPr/>
+        <p:nvPr/>
+      </p:nvGrpSpPr>
+      <p:grpSpPr>
+        <a:xfrm>
+          <a:off x="0" y="0"/>
+          <a:ext cx="0" cy="0"/>
+          <a:chOff x="0" y="0"/>
+          <a:chExt cx="0" cy="0"/>
+        </a:xfrm>
+      </p:grpSpPr>
+      <p:sp>
+        <p:nvSpPr>
+          <p:cNvPr id="3" name="Tekstvak 5">
+            <a:extLst>
+              <a:ext uri="{FF2B5EF4-FFF2-40B4-BE49-F238E27FC236}">
+                <a16:creationId xmlns:a16="http://schemas.microsoft.com/office/drawing/2014/main" id="{BF228A72-8E27-4D93-959C-DF1E03FD1657}"/>
+              </a:ext>
+            </a:extLst>
+          </p:cNvPr>
+          <p:cNvSpPr txBox="1"/>
+          <p:nvPr/>
+        </p:nvSpPr>
+        <p:spPr>
+          <a:xfrm>
+            <a:off x="823491" y="1387596"/>
+            <a:ext cx="4782591" cy="5736955"/>
+          </a:xfrm>
+          <a:prstGeom prst="rect">
+            <a:avLst/>
+          </a:prstGeom>
+          <a:noFill/>
+        </p:spPr>
+        <p:txBody>
+          <a:bodyPr wrap="none" rtlCol="0">
+            <a:spAutoFit/>
+          </a:bodyPr>
+          <a:lstStyle/>
+          <a:p>
+            <a:r>
+              <a:rPr lang="en-US" sz="1960" dirty="0"/>
+              <a:t>During a wait period you will see this screen: </a:t>
+            </a:r>
+          </a:p>
+          <a:p>
+            <a:endParaRPr lang="en-US" sz="1960" dirty="0"/>
+          </a:p>
+          <a:p>
+            <a:endParaRPr lang="en-US" sz="1960" dirty="0"/>
+          </a:p>
+          <a:p>
+            <a:endParaRPr lang="en-US" sz="1960" dirty="0"/>
+          </a:p>
+          <a:p>
+            <a:endParaRPr lang="en-US" sz="1960" dirty="0"/>
+          </a:p>
+          <a:p>
+            <a:endParaRPr lang="en-US" sz="1960" dirty="0"/>
+          </a:p>
+          <a:p>
+            <a:endParaRPr lang="en-US" sz="1960" dirty="0"/>
+          </a:p>
+          <a:p>
+            <a:endParaRPr lang="en-US" sz="1960" dirty="0"/>
+          </a:p>
+          <a:p>
+            <a:endParaRPr lang="en-US" sz="1960" dirty="0"/>
+          </a:p>
+          <a:p>
+            <a:endParaRPr lang="en-US" sz="1960" dirty="0"/>
+          </a:p>
+          <a:p>
+            <a:endParaRPr lang="en-US" sz="1960" dirty="0"/>
+          </a:p>
+          <a:p>
+            <a:endParaRPr lang="en-US" sz="1960" dirty="0"/>
+          </a:p>
+          <a:p>
+            <a:endParaRPr lang="en-US" sz="1960" dirty="0"/>
+          </a:p>
+          <a:p>
+            <a:pPr algn="ctr"/>
+            <a:endParaRPr lang="en-US" sz="1960" dirty="0"/>
+          </a:p>
+          <a:p>
+            <a:pPr algn="ctr"/>
+            <a:endParaRPr lang="en-US" sz="4620" dirty="0"/>
+          </a:p>
+          <a:p>
+            <a:pPr algn="ctr"/>
+            <a:endParaRPr lang="en-US" sz="4620" dirty="0"/>
+          </a:p>
+        </p:txBody>
+      </p:sp>
+      <p:sp>
+        <p:nvSpPr>
+          <p:cNvPr id="6" name="Tekstvak 5">
+            <a:extLst>
+              <a:ext uri="{FF2B5EF4-FFF2-40B4-BE49-F238E27FC236}">
+                <a16:creationId xmlns:a16="http://schemas.microsoft.com/office/drawing/2014/main" id="{A7D3FBCB-F6A3-4FA7-A179-58C1665B6DFD}"/>
+              </a:ext>
+            </a:extLst>
+          </p:cNvPr>
+          <p:cNvSpPr txBox="1"/>
+          <p:nvPr/>
+        </p:nvSpPr>
+        <p:spPr>
+          <a:xfrm>
+            <a:off x="2127358" y="2510291"/>
+            <a:ext cx="4889283" cy="2914644"/>
+          </a:xfrm>
+          <a:prstGeom prst="rect">
+            <a:avLst/>
+          </a:prstGeom>
+          <a:solidFill>
+            <a:schemeClr val="bg1"/>
+          </a:solidFill>
+        </p:spPr>
+        <p:txBody>
+          <a:bodyPr wrap="square" rtlCol="0">
+            <a:spAutoFit/>
+          </a:bodyPr>
+          <a:lstStyle/>
+          <a:p>
+            <a:pPr algn="ctr"/>
+            <a:endParaRPr lang="en-US" sz="1960" dirty="0"/>
+          </a:p>
+          <a:p>
+            <a:pPr algn="ctr"/>
+            <a:endParaRPr lang="en-US" sz="1960" dirty="0"/>
+          </a:p>
+          <a:p>
+            <a:pPr algn="ctr"/>
+            <a:endParaRPr lang="en-US" sz="1960" dirty="0"/>
+          </a:p>
+          <a:p>
+            <a:pPr algn="ctr"/>
+            <a:r>
+              <a:rPr lang="en-US" sz="4620" dirty="0">
+                <a:solidFill>
+                  <a:schemeClr val="bg1"/>
+                </a:solidFill>
+              </a:rPr>
+              <a:t>+</a:t>
+            </a:r>
+          </a:p>
+          <a:p>
+            <a:pPr algn="ctr"/>
+            <a:endParaRPr lang="en-US" sz="1960" dirty="0"/>
+          </a:p>
+          <a:p>
+            <a:endParaRPr lang="en-US" sz="1960" dirty="0"/>
+          </a:p>
+          <a:p>
+            <a:r>
+              <a:rPr lang="en-US" sz="1960" dirty="0"/>
+              <a:t> </a:t>
+            </a:r>
+          </a:p>
+          <a:p>
+            <a:endParaRPr lang="en-US" sz="1960" dirty="0"/>
+          </a:p>
+        </p:txBody>
+      </p:sp>
+      <p:sp>
+        <p:nvSpPr>
+          <p:cNvPr id="8" name="TextBox 7">
+            <a:extLst>
+              <a:ext uri="{FF2B5EF4-FFF2-40B4-BE49-F238E27FC236}">
+                <a16:creationId xmlns:a16="http://schemas.microsoft.com/office/drawing/2014/main" id="{176BCA7B-DF07-434D-B61E-1D85D7125009}"/>
+              </a:ext>
+            </a:extLst>
+          </p:cNvPr>
+          <p:cNvSpPr txBox="1"/>
+          <p:nvPr/>
+        </p:nvSpPr>
+        <p:spPr>
+          <a:xfrm>
+            <a:off x="4114800" y="3217984"/>
+            <a:ext cx="914400" cy="914400"/>
+          </a:xfrm>
+          <a:prstGeom prst="rect">
+            <a:avLst/>
+          </a:prstGeom>
+          <a:noFill/>
+        </p:spPr>
+        <p:txBody>
+          <a:bodyPr wrap="square" rtlCol="0">
+            <a:spAutoFit/>
+          </a:bodyPr>
+          <a:lstStyle/>
+          <a:p>
+            <a:endParaRPr lang="en-US" dirty="0"/>
+          </a:p>
+        </p:txBody>
+      </p:sp>
+      <p:sp>
+        <p:nvSpPr>
+          <p:cNvPr id="5" name="TextBox 4">
+            <a:extLst>
+              <a:ext uri="{FF2B5EF4-FFF2-40B4-BE49-F238E27FC236}">
+                <a16:creationId xmlns:a16="http://schemas.microsoft.com/office/drawing/2014/main" id="{BCEBEBB8-46E6-4D73-910C-079E96EE182C}"/>
+              </a:ext>
+            </a:extLst>
+          </p:cNvPr>
+          <p:cNvSpPr txBox="1"/>
+          <p:nvPr/>
+        </p:nvSpPr>
+        <p:spPr>
+          <a:xfrm>
+            <a:off x="4317977" y="3582892"/>
+            <a:ext cx="2137298" cy="769441"/>
+          </a:xfrm>
+          <a:prstGeom prst="rect">
+            <a:avLst/>
+          </a:prstGeom>
+          <a:noFill/>
+        </p:spPr>
+        <p:txBody>
+          <a:bodyPr wrap="square">
+            <a:spAutoFit/>
+          </a:bodyPr>
+          <a:lstStyle/>
+          <a:p>
+            <a:r>
+              <a:rPr lang="en-US" sz="1800" dirty="0"/>
+              <a:t>… </a:t>
+            </a:r>
+            <a:r>
+              <a:rPr lang="en-US" sz="4400" dirty="0">
+                <a:solidFill>
+                  <a:schemeClr val="bg1"/>
+                </a:solidFill>
+              </a:rPr>
+              <a:t>X</a:t>
+            </a:r>
+            <a:endParaRPr lang="en-US" dirty="0"/>
+          </a:p>
+        </p:txBody>
+      </p:sp>
+    </p:spTree>
+    <p:extLst>
+      <p:ext uri="{BB962C8B-B14F-4D97-AF65-F5344CB8AC3E}">
+        <p14:creationId xmlns:p14="http://schemas.microsoft.com/office/powerpoint/2010/main" val="2468544022"/>
+      </p:ext>
+    </p:extLst>
+  </p:cSld>
+  <p:clrMapOvr>
+    <a:masterClrMapping/>
+  </p:clrMapOvr>
+</p:sld>
+</file>
+
+<file path=ppt/slides/slide14.xml><?xml version="1.0" encoding="utf-8"?>
 <p:sld xmlns:a="http://schemas.openxmlformats.org/drawingml/2006/main" xmlns:r="http://schemas.openxmlformats.org/officeDocument/2006/relationships" xmlns:p="http://schemas.openxmlformats.org/presentationml/2006/main">
   <p:cSld>
     <p:bg>
@@ -5750,7 +6496,7 @@
         <p:spPr>
           <a:xfrm>
             <a:off x="823491" y="1387596"/>
-            <a:ext cx="8118441" cy="4228850"/>
+            <a:ext cx="6852645" cy="4228850"/>
           </a:xfrm>
           <a:prstGeom prst="rect">
             <a:avLst/>
@@ -5785,71 +6531,15 @@
               <a:t>matching</a:t>
             </a:r>
             <a:r>
-              <a:rPr lang="zh-CN" altLang="en-US" sz="1960" dirty="0"/>
+              <a:rPr lang="en-US" sz="1960" dirty="0"/>
               <a:t> </a:t>
             </a:r>
             <a:r>
-              <a:rPr lang="en-US" altLang="zh-CN" sz="1960" dirty="0"/>
-              <a:t>trials,</a:t>
-            </a:r>
-            <a:r>
-              <a:rPr lang="zh-CN" altLang="en-US" sz="1960" dirty="0"/>
-              <a:t> </a:t>
-            </a:r>
-            <a:r>
-              <a:rPr lang="en-US" altLang="zh-CN" sz="1960" dirty="0"/>
-              <a:t>or</a:t>
-            </a:r>
-            <a:r>
-              <a:rPr lang="zh-CN" altLang="en-US" sz="1960" dirty="0"/>
-              <a:t> </a:t>
-            </a:r>
-            <a:r>
-              <a:rPr lang="en-US" altLang="zh-CN" sz="1960" dirty="0"/>
-              <a:t>a</a:t>
-            </a:r>
-            <a:r>
-              <a:rPr lang="zh-CN" altLang="en-US" sz="1960" dirty="0"/>
-              <a:t> </a:t>
-            </a:r>
-            <a:r>
-              <a:rPr lang="en-US" altLang="zh-CN" sz="1960" dirty="0"/>
-              <a:t>mixture</a:t>
-            </a:r>
-            <a:r>
-              <a:rPr lang="zh-CN" altLang="en-US" sz="1960" dirty="0"/>
-              <a:t> </a:t>
-            </a:r>
-            <a:r>
-              <a:rPr lang="en-US" altLang="zh-CN" sz="1960" dirty="0"/>
-              <a:t>of</a:t>
-            </a:r>
-            <a:r>
-              <a:rPr lang="zh-CN" altLang="en-US" sz="1960" dirty="0"/>
-              <a:t> </a:t>
-            </a:r>
-            <a:r>
-              <a:rPr lang="en-US" sz="1960" b="1" i="1" dirty="0">
-                <a:solidFill>
-                  <a:srgbClr val="1B1CD7"/>
-                </a:solidFill>
-              </a:rPr>
-              <a:t>matching</a:t>
-            </a:r>
-            <a:r>
-              <a:rPr lang="zh-CN" altLang="en-US" sz="1960" b="1" i="1" dirty="0">
-                <a:solidFill>
-                  <a:srgbClr val="1B1CD7"/>
-                </a:solidFill>
-              </a:rPr>
-              <a:t> </a:t>
-            </a:r>
-            <a:r>
-              <a:rPr lang="en-US" altLang="zh-CN" sz="1960" dirty="0"/>
-              <a:t>and</a:t>
-            </a:r>
-            <a:r>
-              <a:rPr lang="zh-CN" altLang="en-US" sz="1960" dirty="0"/>
+              <a:rPr lang="en-US" sz="1960" b="1" i="1" dirty="0"/>
+              <a:t>OR</a:t>
+            </a:r>
+            <a:r>
+              <a:rPr lang="en-US" sz="1960" dirty="0"/>
               <a:t> </a:t>
             </a:r>
             <a:r>
@@ -5961,6 +6651,134 @@
           </a:p>
           <a:p>
             <a:endParaRPr lang="en-US" sz="1960" dirty="0"/>
+          </a:p>
+        </p:txBody>
+      </p:sp>
+      <p:sp>
+        <p:nvSpPr>
+          <p:cNvPr id="2" name="TextBox 1">
+            <a:extLst>
+              <a:ext uri="{FF2B5EF4-FFF2-40B4-BE49-F238E27FC236}">
+                <a16:creationId xmlns:a16="http://schemas.microsoft.com/office/drawing/2014/main" id="{9BE1A097-B149-473D-BCFA-CEB1A3106FD2}"/>
+              </a:ext>
+            </a:extLst>
+          </p:cNvPr>
+          <p:cNvSpPr txBox="1"/>
+          <p:nvPr/>
+        </p:nvSpPr>
+        <p:spPr>
+          <a:xfrm>
+            <a:off x="2439699" y="3602749"/>
+            <a:ext cx="1560220" cy="769441"/>
+          </a:xfrm>
+          <a:prstGeom prst="rect">
+            <a:avLst/>
+          </a:prstGeom>
+          <a:noFill/>
+          <a:ln w="31750">
+            <a:solidFill>
+              <a:schemeClr val="tx1"/>
+            </a:solidFill>
+          </a:ln>
+        </p:spPr>
+        <p:txBody>
+          <a:bodyPr wrap="square" rtlCol="0">
+            <a:spAutoFit/>
+          </a:bodyPr>
+          <a:lstStyle/>
+          <a:p>
+            <a:pPr algn="ctr"/>
+            <a:endParaRPr lang="en-US" sz="800" dirty="0"/>
+          </a:p>
+          <a:p>
+            <a:pPr algn="ctr"/>
+            <a:r>
+              <a:rPr lang="en-US" sz="1400" dirty="0"/>
+              <a:t>3</a:t>
+            </a:r>
+          </a:p>
+          <a:p>
+            <a:pPr algn="ctr"/>
+            <a:r>
+              <a:rPr lang="en-US" sz="1400" b="1" dirty="0">
+                <a:solidFill>
+                  <a:srgbClr val="F8A60F"/>
+                </a:solidFill>
+              </a:rPr>
+              <a:t>mismatching</a:t>
+            </a:r>
+          </a:p>
+          <a:p>
+            <a:pPr algn="ctr"/>
+            <a:endParaRPr lang="en-US" sz="800" dirty="0">
+              <a:solidFill>
+                <a:srgbClr val="F8A60F"/>
+              </a:solidFill>
+            </a:endParaRPr>
+          </a:p>
+        </p:txBody>
+      </p:sp>
+      <p:sp>
+        <p:nvSpPr>
+          <p:cNvPr id="7" name="TextBox 6">
+            <a:extLst>
+              <a:ext uri="{FF2B5EF4-FFF2-40B4-BE49-F238E27FC236}">
+                <a16:creationId xmlns:a16="http://schemas.microsoft.com/office/drawing/2014/main" id="{011136B3-76D7-48E2-A086-F50791BBCE5A}"/>
+              </a:ext>
+            </a:extLst>
+          </p:cNvPr>
+          <p:cNvSpPr txBox="1"/>
+          <p:nvPr/>
+        </p:nvSpPr>
+        <p:spPr>
+          <a:xfrm>
+            <a:off x="5144083" y="3582892"/>
+            <a:ext cx="1560220" cy="769441"/>
+          </a:xfrm>
+          <a:prstGeom prst="rect">
+            <a:avLst/>
+          </a:prstGeom>
+          <a:noFill/>
+          <a:ln w="31750">
+            <a:solidFill>
+              <a:schemeClr val="tx1"/>
+            </a:solidFill>
+          </a:ln>
+        </p:spPr>
+        <p:txBody>
+          <a:bodyPr wrap="square" rtlCol="0">
+            <a:spAutoFit/>
+          </a:bodyPr>
+          <a:lstStyle/>
+          <a:p>
+            <a:pPr algn="ctr"/>
+            <a:endParaRPr lang="en-US" sz="800" dirty="0"/>
+          </a:p>
+          <a:p>
+            <a:pPr algn="ctr"/>
+            <a:r>
+              <a:rPr lang="en-US" sz="1400" dirty="0"/>
+              <a:t>2</a:t>
+            </a:r>
+          </a:p>
+          <a:p>
+            <a:pPr algn="ctr"/>
+            <a:r>
+              <a:rPr lang="en-US" sz="1400" b="1" dirty="0">
+                <a:solidFill>
+                  <a:srgbClr val="1B1CD7"/>
+                </a:solidFill>
+              </a:rPr>
+              <a:t>matching</a:t>
+            </a:r>
+          </a:p>
+          <a:p>
+            <a:pPr algn="ctr"/>
+            <a:endParaRPr lang="en-US" sz="800" dirty="0">
+              <a:solidFill>
+                <a:srgbClr val="F8A60F"/>
+              </a:solidFill>
+            </a:endParaRPr>
           </a:p>
         </p:txBody>
       </p:sp>
@@ -6087,7 +6905,7 @@
         </p:blipFill>
         <p:spPr>
           <a:xfrm>
-            <a:off x="2767326" y="4671155"/>
+            <a:off x="2767326" y="4546460"/>
             <a:ext cx="914400" cy="570636"/>
           </a:xfrm>
           <a:prstGeom prst="rect">
@@ -6116,7 +6934,7 @@
         </p:blipFill>
         <p:spPr>
           <a:xfrm>
-            <a:off x="5361729" y="4665067"/>
+            <a:off x="5361729" y="4540372"/>
             <a:ext cx="990930" cy="570636"/>
           </a:xfrm>
           <a:prstGeom prst="rect">
@@ -6124,184 +6942,6 @@
           </a:prstGeom>
         </p:spPr>
       </p:pic>
-      <p:sp>
-        <p:nvSpPr>
-          <p:cNvPr id="11" name="TextBox 10">
-            <a:extLst>
-              <a:ext uri="{FF2B5EF4-FFF2-40B4-BE49-F238E27FC236}">
-                <a16:creationId xmlns:a16="http://schemas.microsoft.com/office/drawing/2014/main" id="{A5FA9298-1C09-0D46-B7CF-CD8DF5C4C725}"/>
-              </a:ext>
-            </a:extLst>
-          </p:cNvPr>
-          <p:cNvSpPr txBox="1"/>
-          <p:nvPr/>
-        </p:nvSpPr>
-        <p:spPr>
-          <a:xfrm>
-            <a:off x="5226660" y="3200968"/>
-            <a:ext cx="1560220" cy="1415772"/>
-          </a:xfrm>
-          <a:prstGeom prst="rect">
-            <a:avLst/>
-          </a:prstGeom>
-          <a:noFill/>
-          <a:ln w="31750">
-            <a:solidFill>
-              <a:schemeClr val="tx1"/>
-            </a:solidFill>
-          </a:ln>
-        </p:spPr>
-        <p:txBody>
-          <a:bodyPr wrap="square" rtlCol="0">
-            <a:spAutoFit/>
-          </a:bodyPr>
-          <a:lstStyle/>
-          <a:p>
-            <a:pPr algn="ctr"/>
-            <a:endParaRPr lang="en-US" sz="800" dirty="0"/>
-          </a:p>
-          <a:p>
-            <a:pPr algn="ctr"/>
-            <a:r>
-              <a:rPr lang="en-US" sz="1400" dirty="0"/>
-              <a:t>2</a:t>
-            </a:r>
-          </a:p>
-          <a:p>
-            <a:pPr algn="ctr"/>
-            <a:r>
-              <a:rPr lang="en-US" sz="1400" b="1" dirty="0">
-                <a:solidFill>
-                  <a:srgbClr val="F8A60F"/>
-                </a:solidFill>
-              </a:rPr>
-              <a:t>mismatching</a:t>
-            </a:r>
-          </a:p>
-          <a:p>
-            <a:pPr algn="ctr"/>
-            <a:r>
-              <a:rPr lang="en-US" sz="1400" dirty="0"/>
-              <a:t>&amp;</a:t>
-            </a:r>
-          </a:p>
-          <a:p>
-            <a:pPr algn="ctr"/>
-            <a:r>
-              <a:rPr lang="en-US" sz="1400" dirty="0"/>
-              <a:t>4 </a:t>
-            </a:r>
-          </a:p>
-          <a:p>
-            <a:pPr algn="ctr"/>
-            <a:r>
-              <a:rPr lang="en-US" sz="1400" b="1" dirty="0">
-                <a:solidFill>
-                  <a:srgbClr val="1B1CD7"/>
-                </a:solidFill>
-              </a:rPr>
-              <a:t>matching</a:t>
-            </a:r>
-            <a:endParaRPr lang="en-US" sz="1400" b="1" dirty="0">
-              <a:solidFill>
-                <a:srgbClr val="F8A60F"/>
-              </a:solidFill>
-            </a:endParaRPr>
-          </a:p>
-          <a:p>
-            <a:pPr algn="ctr"/>
-            <a:endParaRPr lang="en-US" sz="800" dirty="0">
-              <a:solidFill>
-                <a:srgbClr val="F8A60F"/>
-              </a:solidFill>
-            </a:endParaRPr>
-          </a:p>
-        </p:txBody>
-      </p:sp>
-      <p:sp>
-        <p:nvSpPr>
-          <p:cNvPr id="13" name="TextBox 12">
-            <a:extLst>
-              <a:ext uri="{FF2B5EF4-FFF2-40B4-BE49-F238E27FC236}">
-                <a16:creationId xmlns:a16="http://schemas.microsoft.com/office/drawing/2014/main" id="{0FED5309-8277-524F-A87A-77ED1EC3B024}"/>
-              </a:ext>
-            </a:extLst>
-          </p:cNvPr>
-          <p:cNvSpPr txBox="1"/>
-          <p:nvPr/>
-        </p:nvSpPr>
-        <p:spPr>
-          <a:xfrm>
-            <a:off x="2439699" y="3200968"/>
-            <a:ext cx="1560220" cy="1415772"/>
-          </a:xfrm>
-          <a:prstGeom prst="rect">
-            <a:avLst/>
-          </a:prstGeom>
-          <a:noFill/>
-          <a:ln w="31750">
-            <a:solidFill>
-              <a:schemeClr val="tx1"/>
-            </a:solidFill>
-          </a:ln>
-        </p:spPr>
-        <p:txBody>
-          <a:bodyPr wrap="square" rtlCol="0">
-            <a:spAutoFit/>
-          </a:bodyPr>
-          <a:lstStyle/>
-          <a:p>
-            <a:pPr algn="ctr"/>
-            <a:endParaRPr lang="en-US" sz="800" dirty="0"/>
-          </a:p>
-          <a:p>
-            <a:pPr algn="ctr"/>
-            <a:endParaRPr lang="en-US" sz="1400" dirty="0"/>
-          </a:p>
-          <a:p>
-            <a:pPr algn="ctr"/>
-            <a:r>
-              <a:rPr lang="en-US" sz="1400" dirty="0"/>
-              <a:t>6</a:t>
-            </a:r>
-          </a:p>
-          <a:p>
-            <a:pPr algn="ctr"/>
-            <a:r>
-              <a:rPr lang="en-US" sz="1400" b="1" dirty="0">
-                <a:solidFill>
-                  <a:srgbClr val="1B1CD7"/>
-                </a:solidFill>
-              </a:rPr>
-              <a:t>matching</a:t>
-            </a:r>
-          </a:p>
-          <a:p>
-            <a:pPr algn="ctr"/>
-            <a:endParaRPr lang="en-US" sz="1400" b="1" dirty="0">
-              <a:solidFill>
-                <a:srgbClr val="1B1CD7"/>
-              </a:solidFill>
-            </a:endParaRPr>
-          </a:p>
-          <a:p>
-            <a:pPr algn="ctr"/>
-            <a:endParaRPr lang="en-US" sz="1400" b="1" dirty="0">
-              <a:solidFill>
-                <a:srgbClr val="1B1CD7"/>
-              </a:solidFill>
-            </a:endParaRPr>
-          </a:p>
-          <a:p>
-            <a:pPr algn="ctr"/>
-            <a:endParaRPr lang="en-US" sz="800" dirty="0">
-              <a:solidFill>
-                <a:srgbClr val="F8A60F"/>
-              </a:solidFill>
-            </a:endParaRPr>
-          </a:p>
-        </p:txBody>
-      </p:sp>
     </p:spTree>
     <p:extLst>
       <p:ext uri="{BB962C8B-B14F-4D97-AF65-F5344CB8AC3E}">
@@ -6356,8 +6996,8 @@
         </p:nvSpPr>
         <p:spPr>
           <a:xfrm>
-            <a:off x="823490" y="1387596"/>
-            <a:ext cx="8133473" cy="3711785"/>
+            <a:off x="823491" y="1387596"/>
+            <a:ext cx="7414530" cy="4228850"/>
           </a:xfrm>
           <a:prstGeom prst="rect">
             <a:avLst/>
@@ -6365,73 +7005,305 @@
           <a:noFill/>
         </p:spPr>
         <p:txBody>
+          <a:bodyPr wrap="none" rtlCol="0">
+            <a:spAutoFit/>
+          </a:bodyPr>
+          <a:lstStyle/>
+          <a:p>
+            <a:r>
+              <a:rPr lang="en-US" sz="1960" dirty="0"/>
+              <a:t>You will use the left arrow</a:t>
+            </a:r>
+            <a:r>
+              <a:rPr lang="en-US" sz="1960" dirty="0">
+                <a:sym typeface="Wingdings" panose="05000000000000000000" pitchFamily="2" charset="2"/>
+              </a:rPr>
+              <a:t> key </a:t>
+            </a:r>
+            <a:r>
+              <a:rPr lang="en-US" sz="1960" dirty="0"/>
+              <a:t>to choose the option on the left and the </a:t>
+            </a:r>
+          </a:p>
+          <a:p>
+            <a:endParaRPr lang="en-US" sz="1960" dirty="0">
+              <a:sym typeface="Wingdings" panose="05000000000000000000" pitchFamily="2" charset="2"/>
+            </a:endParaRPr>
+          </a:p>
+          <a:p>
+            <a:r>
+              <a:rPr lang="en-US" sz="1960" dirty="0">
+                <a:sym typeface="Wingdings" panose="05000000000000000000" pitchFamily="2" charset="2"/>
+              </a:rPr>
+              <a:t>right arrow </a:t>
+            </a:r>
+            <a:r>
+              <a:rPr lang="en-US" sz="1960" dirty="0"/>
+              <a:t>key to choose the option on the right.</a:t>
+            </a:r>
+          </a:p>
+          <a:p>
+            <a:endParaRPr lang="en-US" sz="1960" dirty="0"/>
+          </a:p>
+          <a:p>
+            <a:endParaRPr lang="en-US" sz="1960" dirty="0"/>
+          </a:p>
+          <a:p>
+            <a:endParaRPr lang="en-US" sz="1960" dirty="0"/>
+          </a:p>
+          <a:p>
+            <a:endParaRPr lang="en-US" sz="1960" dirty="0"/>
+          </a:p>
+          <a:p>
+            <a:endParaRPr lang="en-US" sz="1960" dirty="0"/>
+          </a:p>
+          <a:p>
+            <a:pPr algn="ctr"/>
+            <a:endParaRPr lang="en-US" sz="1960" dirty="0"/>
+          </a:p>
+          <a:p>
+            <a:pPr algn="ctr"/>
+            <a:endParaRPr lang="en-US" sz="4620" dirty="0"/>
+          </a:p>
+          <a:p>
+            <a:pPr algn="ctr"/>
+            <a:endParaRPr lang="en-US" sz="4620" dirty="0"/>
+          </a:p>
+        </p:txBody>
+      </p:sp>
+      <p:sp>
+        <p:nvSpPr>
+          <p:cNvPr id="6" name="Tekstvak 5">
+            <a:extLst>
+              <a:ext uri="{FF2B5EF4-FFF2-40B4-BE49-F238E27FC236}">
+                <a16:creationId xmlns:a16="http://schemas.microsoft.com/office/drawing/2014/main" id="{A7D3FBCB-F6A3-4FA7-A179-58C1665B6DFD}"/>
+              </a:ext>
+            </a:extLst>
+          </p:cNvPr>
+          <p:cNvSpPr txBox="1"/>
+          <p:nvPr/>
+        </p:nvSpPr>
+        <p:spPr>
+          <a:xfrm>
+            <a:off x="2127358" y="2510291"/>
+            <a:ext cx="4889283" cy="2914644"/>
+          </a:xfrm>
+          <a:prstGeom prst="rect">
+            <a:avLst/>
+          </a:prstGeom>
+          <a:solidFill>
+            <a:schemeClr val="bg1"/>
+          </a:solidFill>
+        </p:spPr>
+        <p:txBody>
           <a:bodyPr wrap="square" rtlCol="0">
             <a:spAutoFit/>
           </a:bodyPr>
           <a:lstStyle/>
           <a:p>
+            <a:pPr algn="ctr"/>
+            <a:endParaRPr lang="en-US" sz="1960" dirty="0"/>
+          </a:p>
+          <a:p>
+            <a:pPr algn="ctr"/>
+            <a:endParaRPr lang="en-US" sz="1960" dirty="0"/>
+          </a:p>
+          <a:p>
+            <a:pPr algn="ctr"/>
+            <a:endParaRPr lang="en-US" sz="1960" dirty="0"/>
+          </a:p>
+          <a:p>
+            <a:pPr algn="ctr"/>
+            <a:r>
+              <a:rPr lang="en-US" sz="4620" dirty="0">
+                <a:solidFill>
+                  <a:schemeClr val="bg1"/>
+                </a:solidFill>
+              </a:rPr>
+              <a:t>+</a:t>
+            </a:r>
+          </a:p>
+          <a:p>
+            <a:pPr algn="ctr"/>
+            <a:endParaRPr lang="en-US" sz="1960" dirty="0"/>
+          </a:p>
+          <a:p>
+            <a:endParaRPr lang="en-US" sz="1960" dirty="0"/>
+          </a:p>
+          <a:p>
             <a:r>
               <a:rPr lang="en-US" sz="1960" dirty="0"/>
-              <a:t>The overall number of trials will be the same for both options, and</a:t>
-            </a:r>
-          </a:p>
-          <a:p>
-            <a:endParaRPr lang="en-US" sz="1960" dirty="0"/>
-          </a:p>
-          <a:p>
-            <a:r>
-              <a:rPr lang="en-US" sz="1960" dirty="0"/>
-              <a:t>both options will take the same amount of time. So</a:t>
-            </a:r>
-            <a:r>
-              <a:rPr lang="en-US" altLang="zh-CN" sz="1960" dirty="0"/>
-              <a:t>,</a:t>
-            </a:r>
-            <a:r>
-              <a:rPr lang="en-US" sz="1960" dirty="0"/>
-              <a:t> the </a:t>
-            </a:r>
-            <a:r>
-              <a:rPr lang="en-US" sz="1960" b="1" dirty="0"/>
-              <a:t>game will take</a:t>
-            </a:r>
-          </a:p>
-          <a:p>
-            <a:endParaRPr lang="en-US" sz="1960" b="1" dirty="0"/>
-          </a:p>
-          <a:p>
-            <a:r>
-              <a:rPr lang="en-US" sz="1960" b="1" dirty="0"/>
-              <a:t> the same amount of time no matter which options you choose</a:t>
-            </a:r>
-            <a:r>
-              <a:rPr lang="en-US" sz="1960" dirty="0"/>
-              <a:t>.</a:t>
-            </a:r>
-          </a:p>
-          <a:p>
-            <a:endParaRPr lang="en-US" sz="1960" dirty="0"/>
-          </a:p>
-          <a:p>
-            <a:endParaRPr lang="en-US" sz="1960" dirty="0"/>
-          </a:p>
-          <a:p>
-            <a:endParaRPr lang="en-US" sz="1960" dirty="0"/>
-          </a:p>
-          <a:p>
-            <a:endParaRPr lang="en-US" sz="1960" dirty="0"/>
-          </a:p>
-          <a:p>
-            <a:pPr algn="ctr"/>
-            <a:endParaRPr lang="en-US" sz="1960" dirty="0"/>
-          </a:p>
-          <a:p>
-            <a:pPr algn="ctr"/>
-            <a:endParaRPr lang="en-US" sz="1960" dirty="0"/>
-          </a:p>
-          <a:p>
-            <a:pPr algn="ctr"/>
-            <a:endParaRPr lang="en-US" sz="1960" dirty="0"/>
+              <a:t> </a:t>
+            </a:r>
+          </a:p>
+          <a:p>
+            <a:endParaRPr lang="en-US" sz="1960" dirty="0"/>
+          </a:p>
+        </p:txBody>
+      </p:sp>
+      <p:sp>
+        <p:nvSpPr>
+          <p:cNvPr id="2" name="TextBox 1">
+            <a:extLst>
+              <a:ext uri="{FF2B5EF4-FFF2-40B4-BE49-F238E27FC236}">
+                <a16:creationId xmlns:a16="http://schemas.microsoft.com/office/drawing/2014/main" id="{9BE1A097-B149-473D-BCFA-CEB1A3106FD2}"/>
+              </a:ext>
+            </a:extLst>
+          </p:cNvPr>
+          <p:cNvSpPr txBox="1"/>
+          <p:nvPr/>
+        </p:nvSpPr>
+        <p:spPr>
+          <a:xfrm>
+            <a:off x="2439699" y="3602749"/>
+            <a:ext cx="1560220" cy="769441"/>
+          </a:xfrm>
+          <a:prstGeom prst="rect">
+            <a:avLst/>
+          </a:prstGeom>
+          <a:noFill/>
+          <a:ln w="31750">
+            <a:solidFill>
+              <a:schemeClr val="tx1"/>
+            </a:solidFill>
+          </a:ln>
+        </p:spPr>
+        <p:txBody>
+          <a:bodyPr wrap="square" rtlCol="0">
+            <a:spAutoFit/>
+          </a:bodyPr>
+          <a:lstStyle/>
+          <a:p>
+            <a:pPr algn="ctr"/>
+            <a:endParaRPr lang="en-US" sz="800" dirty="0"/>
+          </a:p>
+          <a:p>
+            <a:pPr algn="ctr"/>
+            <a:r>
+              <a:rPr lang="en-US" sz="1400" dirty="0"/>
+              <a:t>3</a:t>
+            </a:r>
+          </a:p>
+          <a:p>
+            <a:pPr algn="ctr"/>
+            <a:r>
+              <a:rPr lang="en-US" sz="1400" b="1" dirty="0">
+                <a:solidFill>
+                  <a:srgbClr val="F8A60F"/>
+                </a:solidFill>
+              </a:rPr>
+              <a:t>mismatching</a:t>
+            </a:r>
+          </a:p>
+          <a:p>
+            <a:pPr algn="ctr"/>
+            <a:endParaRPr lang="en-US" sz="800" dirty="0">
+              <a:solidFill>
+                <a:srgbClr val="F8A60F"/>
+              </a:solidFill>
+            </a:endParaRPr>
+          </a:p>
+        </p:txBody>
+      </p:sp>
+      <p:sp>
+        <p:nvSpPr>
+          <p:cNvPr id="7" name="TextBox 6">
+            <a:extLst>
+              <a:ext uri="{FF2B5EF4-FFF2-40B4-BE49-F238E27FC236}">
+                <a16:creationId xmlns:a16="http://schemas.microsoft.com/office/drawing/2014/main" id="{011136B3-76D7-48E2-A086-F50791BBCE5A}"/>
+              </a:ext>
+            </a:extLst>
+          </p:cNvPr>
+          <p:cNvSpPr txBox="1"/>
+          <p:nvPr/>
+        </p:nvSpPr>
+        <p:spPr>
+          <a:xfrm>
+            <a:off x="5144083" y="3582892"/>
+            <a:ext cx="1560220" cy="769441"/>
+          </a:xfrm>
+          <a:prstGeom prst="rect">
+            <a:avLst/>
+          </a:prstGeom>
+          <a:noFill/>
+          <a:ln w="31750">
+            <a:solidFill>
+              <a:schemeClr val="tx1"/>
+            </a:solidFill>
+          </a:ln>
+        </p:spPr>
+        <p:txBody>
+          <a:bodyPr wrap="square" rtlCol="0">
+            <a:spAutoFit/>
+          </a:bodyPr>
+          <a:lstStyle/>
+          <a:p>
+            <a:pPr algn="ctr"/>
+            <a:endParaRPr lang="en-US" sz="800" dirty="0"/>
+          </a:p>
+          <a:p>
+            <a:pPr algn="ctr"/>
+            <a:r>
+              <a:rPr lang="en-US" sz="1400" dirty="0"/>
+              <a:t>2</a:t>
+            </a:r>
+          </a:p>
+          <a:p>
+            <a:pPr algn="ctr"/>
+            <a:r>
+              <a:rPr lang="en-US" sz="1400" b="1" dirty="0">
+                <a:solidFill>
+                  <a:srgbClr val="1B1CD7"/>
+                </a:solidFill>
+              </a:rPr>
+              <a:t>matching</a:t>
+            </a:r>
+          </a:p>
+          <a:p>
+            <a:pPr algn="ctr"/>
+            <a:endParaRPr lang="en-US" sz="800" dirty="0">
+              <a:solidFill>
+                <a:srgbClr val="F8A60F"/>
+              </a:solidFill>
+            </a:endParaRPr>
+          </a:p>
+        </p:txBody>
+      </p:sp>
+      <p:sp>
+        <p:nvSpPr>
+          <p:cNvPr id="4" name="TextBox 3">
+            <a:extLst>
+              <a:ext uri="{FF2B5EF4-FFF2-40B4-BE49-F238E27FC236}">
+                <a16:creationId xmlns:a16="http://schemas.microsoft.com/office/drawing/2014/main" id="{F9A30FC6-95B9-4A60-B131-2E6F9192A7CD}"/>
+              </a:ext>
+            </a:extLst>
+          </p:cNvPr>
+          <p:cNvSpPr txBox="1"/>
+          <p:nvPr/>
+        </p:nvSpPr>
+        <p:spPr>
+          <a:xfrm>
+            <a:off x="4312260" y="3547723"/>
+            <a:ext cx="914400" cy="1077218"/>
+          </a:xfrm>
+          <a:prstGeom prst="rect">
+            <a:avLst/>
+          </a:prstGeom>
+          <a:noFill/>
+        </p:spPr>
+        <p:txBody>
+          <a:bodyPr wrap="square" rtlCol="0">
+            <a:spAutoFit/>
+          </a:bodyPr>
+          <a:lstStyle/>
+          <a:p>
+            <a:r>
+              <a:rPr lang="en-US" sz="4600" dirty="0"/>
+              <a:t>+</a:t>
+            </a:r>
+          </a:p>
+          <a:p>
+            <a:endParaRPr lang="en-US" dirty="0"/>
           </a:p>
         </p:txBody>
       </p:sp>
@@ -6499,10 +7371,68 @@
           </a:p>
         </p:txBody>
       </p:sp>
+      <p:pic>
+        <p:nvPicPr>
+          <p:cNvPr id="10" name="Picture 9">
+            <a:extLst>
+              <a:ext uri="{FF2B5EF4-FFF2-40B4-BE49-F238E27FC236}">
+                <a16:creationId xmlns:a16="http://schemas.microsoft.com/office/drawing/2014/main" id="{BE8F88AE-BFDB-4290-AB1F-68A7983695C2}"/>
+              </a:ext>
+            </a:extLst>
+          </p:cNvPr>
+          <p:cNvPicPr>
+            <a:picLocks noChangeAspect="1"/>
+          </p:cNvPicPr>
+          <p:nvPr/>
+        </p:nvPicPr>
+        <p:blipFill rotWithShape="1">
+          <a:blip r:embed="rId3"/>
+          <a:srcRect l="9006" t="73963" r="73248"/>
+          <a:stretch/>
+        </p:blipFill>
+        <p:spPr>
+          <a:xfrm>
+            <a:off x="2767326" y="4546460"/>
+            <a:ext cx="914400" cy="570636"/>
+          </a:xfrm>
+          <a:prstGeom prst="rect">
+            <a:avLst/>
+          </a:prstGeom>
+        </p:spPr>
+      </p:pic>
+      <p:pic>
+        <p:nvPicPr>
+          <p:cNvPr id="12" name="Picture 11">
+            <a:extLst>
+              <a:ext uri="{FF2B5EF4-FFF2-40B4-BE49-F238E27FC236}">
+                <a16:creationId xmlns:a16="http://schemas.microsoft.com/office/drawing/2014/main" id="{B4C8378F-63AB-4822-9A02-8132F3DE065A}"/>
+              </a:ext>
+            </a:extLst>
+          </p:cNvPr>
+          <p:cNvPicPr>
+            <a:picLocks noChangeAspect="1"/>
+          </p:cNvPicPr>
+          <p:nvPr/>
+        </p:nvPicPr>
+        <p:blipFill rotWithShape="1">
+          <a:blip r:embed="rId3"/>
+          <a:srcRect l="70615" t="73963" r="10154"/>
+          <a:stretch/>
+        </p:blipFill>
+        <p:spPr>
+          <a:xfrm>
+            <a:off x="5361729" y="4540372"/>
+            <a:ext cx="990930" cy="570636"/>
+          </a:xfrm>
+          <a:prstGeom prst="rect">
+            <a:avLst/>
+          </a:prstGeom>
+        </p:spPr>
+      </p:pic>
     </p:spTree>
     <p:extLst>
       <p:ext uri="{BB962C8B-B14F-4D97-AF65-F5344CB8AC3E}">
-        <p14:creationId xmlns:p14="http://schemas.microsoft.com/office/powerpoint/2010/main" val="2521223150"/>
+        <p14:creationId xmlns:p14="http://schemas.microsoft.com/office/powerpoint/2010/main" val="1442581818"/>
       </p:ext>
     </p:extLst>
   </p:cSld>
@@ -6541,6 +7471,80 @@
       </p:grpSpPr>
       <p:sp>
         <p:nvSpPr>
+          <p:cNvPr id="3" name="Tekstvak 5">
+            <a:extLst>
+              <a:ext uri="{FF2B5EF4-FFF2-40B4-BE49-F238E27FC236}">
+                <a16:creationId xmlns:a16="http://schemas.microsoft.com/office/drawing/2014/main" id="{BF228A72-8E27-4D93-959C-DF1E03FD1657}"/>
+              </a:ext>
+            </a:extLst>
+          </p:cNvPr>
+          <p:cNvSpPr txBox="1"/>
+          <p:nvPr/>
+        </p:nvSpPr>
+        <p:spPr>
+          <a:xfrm>
+            <a:off x="823491" y="1387596"/>
+            <a:ext cx="6890091" cy="4530471"/>
+          </a:xfrm>
+          <a:prstGeom prst="rect">
+            <a:avLst/>
+          </a:prstGeom>
+          <a:noFill/>
+        </p:spPr>
+        <p:txBody>
+          <a:bodyPr wrap="none" rtlCol="0">
+            <a:spAutoFit/>
+          </a:bodyPr>
+          <a:lstStyle/>
+          <a:p>
+            <a:r>
+              <a:rPr lang="en-US" sz="1960" dirty="0"/>
+              <a:t>Once you make your selection, that batch will become highlighted</a:t>
+            </a:r>
+          </a:p>
+          <a:p>
+            <a:endParaRPr lang="en-US" sz="1960" dirty="0"/>
+          </a:p>
+          <a:p>
+            <a:r>
+              <a:rPr lang="en-US" sz="1960" dirty="0"/>
+              <a:t>in green.</a:t>
+            </a:r>
+          </a:p>
+          <a:p>
+            <a:endParaRPr lang="en-US" sz="1960" dirty="0"/>
+          </a:p>
+          <a:p>
+            <a:endParaRPr lang="en-US" sz="1960" dirty="0"/>
+          </a:p>
+          <a:p>
+            <a:endParaRPr lang="en-US" sz="1960" dirty="0"/>
+          </a:p>
+          <a:p>
+            <a:endParaRPr lang="en-US" sz="1960" dirty="0"/>
+          </a:p>
+          <a:p>
+            <a:endParaRPr lang="en-US" sz="1960" dirty="0"/>
+          </a:p>
+          <a:p>
+            <a:endParaRPr lang="en-US" sz="1960" dirty="0"/>
+          </a:p>
+          <a:p>
+            <a:pPr algn="ctr"/>
+            <a:endParaRPr lang="en-US" sz="1960" dirty="0"/>
+          </a:p>
+          <a:p>
+            <a:pPr algn="ctr"/>
+            <a:endParaRPr lang="en-US" sz="4620" dirty="0"/>
+          </a:p>
+          <a:p>
+            <a:pPr algn="ctr"/>
+            <a:endParaRPr lang="en-US" sz="4620" dirty="0"/>
+          </a:p>
+        </p:txBody>
+      </p:sp>
+      <p:sp>
+        <p:nvSpPr>
           <p:cNvPr id="6" name="Tekstvak 5">
             <a:extLst>
               <a:ext uri="{FF2B5EF4-FFF2-40B4-BE49-F238E27FC236}">
@@ -6611,10 +7615,10 @@
       </p:sp>
       <p:sp>
         <p:nvSpPr>
-          <p:cNvPr id="3" name="Tekstvak 5">
+          <p:cNvPr id="2" name="TextBox 1">
             <a:extLst>
               <a:ext uri="{FF2B5EF4-FFF2-40B4-BE49-F238E27FC236}">
-                <a16:creationId xmlns:a16="http://schemas.microsoft.com/office/drawing/2014/main" id="{BF228A72-8E27-4D93-959C-DF1E03FD1657}"/>
+                <a16:creationId xmlns:a16="http://schemas.microsoft.com/office/drawing/2014/main" id="{9BE1A097-B149-473D-BCFA-CEB1A3106FD2}"/>
               </a:ext>
             </a:extLst>
           </p:cNvPr>
@@ -6623,97 +7627,8 @@
         </p:nvSpPr>
         <p:spPr>
           <a:xfrm>
-            <a:off x="823491" y="1387596"/>
-            <a:ext cx="7414530" cy="4228850"/>
-          </a:xfrm>
-          <a:prstGeom prst="rect">
-            <a:avLst/>
-          </a:prstGeom>
-          <a:noFill/>
-        </p:spPr>
-        <p:txBody>
-          <a:bodyPr wrap="none" rtlCol="0">
-            <a:spAutoFit/>
-          </a:bodyPr>
-          <a:lstStyle/>
-          <a:p>
-            <a:r>
-              <a:rPr lang="en-US" sz="1960" dirty="0"/>
-              <a:t>You will use the left arrow</a:t>
-            </a:r>
-            <a:r>
-              <a:rPr lang="en-US" sz="1960" dirty="0">
-                <a:sym typeface="Wingdings" panose="05000000000000000000" pitchFamily="2" charset="2"/>
-              </a:rPr>
-              <a:t> key </a:t>
-            </a:r>
-            <a:r>
-              <a:rPr lang="en-US" sz="1960" dirty="0"/>
-              <a:t>to choose the option on the left and the </a:t>
-            </a:r>
-          </a:p>
-          <a:p>
-            <a:endParaRPr lang="en-US" sz="1960" dirty="0">
-              <a:sym typeface="Wingdings" panose="05000000000000000000" pitchFamily="2" charset="2"/>
-            </a:endParaRPr>
-          </a:p>
-          <a:p>
-            <a:r>
-              <a:rPr lang="en-US" sz="1960" dirty="0">
-                <a:sym typeface="Wingdings" panose="05000000000000000000" pitchFamily="2" charset="2"/>
-              </a:rPr>
-              <a:t>right arrow </a:t>
-            </a:r>
-            <a:r>
-              <a:rPr lang="en-US" sz="1960" dirty="0"/>
-              <a:t>key to choose the option on the right.</a:t>
-            </a:r>
-          </a:p>
-          <a:p>
-            <a:endParaRPr lang="en-US" sz="1960" dirty="0"/>
-          </a:p>
-          <a:p>
-            <a:endParaRPr lang="en-US" sz="1960" dirty="0"/>
-          </a:p>
-          <a:p>
-            <a:endParaRPr lang="en-US" sz="1960" dirty="0"/>
-          </a:p>
-          <a:p>
-            <a:endParaRPr lang="en-US" sz="1960" dirty="0"/>
-          </a:p>
-          <a:p>
-            <a:endParaRPr lang="en-US" sz="1960" dirty="0"/>
-          </a:p>
-          <a:p>
-            <a:pPr algn="ctr"/>
-            <a:endParaRPr lang="en-US" sz="1960" dirty="0"/>
-          </a:p>
-          <a:p>
-            <a:pPr algn="ctr"/>
-            <a:endParaRPr lang="en-US" sz="4620" dirty="0"/>
-          </a:p>
-          <a:p>
-            <a:pPr algn="ctr"/>
-            <a:endParaRPr lang="en-US" sz="4620" dirty="0"/>
-          </a:p>
-        </p:txBody>
-      </p:sp>
-      <p:sp>
-        <p:nvSpPr>
-          <p:cNvPr id="19" name="TextBox 18">
-            <a:extLst>
-              <a:ext uri="{FF2B5EF4-FFF2-40B4-BE49-F238E27FC236}">
-                <a16:creationId xmlns:a16="http://schemas.microsoft.com/office/drawing/2014/main" id="{D21B8132-BF4C-3D48-AF49-99D4B33A2C6C}"/>
-              </a:ext>
-            </a:extLst>
-          </p:cNvPr>
-          <p:cNvSpPr txBox="1"/>
-          <p:nvPr/>
-        </p:nvSpPr>
-        <p:spPr>
-          <a:xfrm>
-            <a:off x="5226660" y="3200968"/>
-            <a:ext cx="1560220" cy="1415772"/>
+            <a:off x="2439699" y="3602749"/>
+            <a:ext cx="1560220" cy="769441"/>
           </a:xfrm>
           <a:prstGeom prst="rect">
             <a:avLst/>
@@ -6738,7 +7653,7 @@
             <a:pPr algn="ctr"/>
             <a:r>
               <a:rPr lang="en-US" sz="1400" dirty="0"/>
-              <a:t>2</a:t>
+              <a:t>3</a:t>
             </a:r>
           </a:p>
           <a:p>
@@ -6754,16 +7669,55 @@
           </a:p>
           <a:p>
             <a:pPr algn="ctr"/>
+            <a:endParaRPr lang="en-US" sz="800" dirty="0">
+              <a:solidFill>
+                <a:srgbClr val="F8A60F"/>
+              </a:solidFill>
+            </a:endParaRPr>
+          </a:p>
+        </p:txBody>
+      </p:sp>
+      <p:sp>
+        <p:nvSpPr>
+          <p:cNvPr id="7" name="TextBox 6">
+            <a:extLst>
+              <a:ext uri="{FF2B5EF4-FFF2-40B4-BE49-F238E27FC236}">
+                <a16:creationId xmlns:a16="http://schemas.microsoft.com/office/drawing/2014/main" id="{011136B3-76D7-48E2-A086-F50791BBCE5A}"/>
+              </a:ext>
+            </a:extLst>
+          </p:cNvPr>
+          <p:cNvSpPr txBox="1"/>
+          <p:nvPr/>
+        </p:nvSpPr>
+        <p:spPr>
+          <a:xfrm>
+            <a:off x="5144083" y="3582892"/>
+            <a:ext cx="1560220" cy="769441"/>
+          </a:xfrm>
+          <a:prstGeom prst="rect">
+            <a:avLst/>
+          </a:prstGeom>
+          <a:noFill/>
+          <a:ln w="31750">
+            <a:solidFill>
+              <a:srgbClr val="00AB36"/>
+            </a:solidFill>
+          </a:ln>
+        </p:spPr>
+        <p:txBody>
+          <a:bodyPr wrap="square" rtlCol="0">
+            <a:spAutoFit/>
+          </a:bodyPr>
+          <a:lstStyle/>
+          <a:p>
+            <a:pPr algn="ctr"/>
+            <a:endParaRPr lang="en-US" sz="800" dirty="0"/>
+          </a:p>
+          <a:p>
+            <a:pPr algn="ctr"/>
             <a:r>
               <a:rPr lang="en-US" sz="1400" dirty="0"/>
-              <a:t>&amp;</a:t>
-            </a:r>
-          </a:p>
-          <a:p>
-            <a:pPr algn="ctr"/>
-            <a:r>
-              <a:rPr lang="en-US" sz="1400" dirty="0"/>
-              <a:t>4 </a:t>
+              <a:t>2</a:t>
             </a:r>
           </a:p>
           <a:p>
@@ -6776,11 +7730,6 @@
               </a:rPr>
               <a:t>matching</a:t>
             </a:r>
-            <a:endParaRPr lang="en-US" sz="1400" b="1" dirty="0">
-              <a:solidFill>
-                <a:srgbClr val="F8A60F"/>
-              </a:solidFill>
-            </a:endParaRPr>
           </a:p>
           <a:p>
             <a:pPr algn="ctr"/>
@@ -6896,10 +7845,10 @@
       </p:sp>
       <p:pic>
         <p:nvPicPr>
-          <p:cNvPr id="16" name="Picture 15">
+          <p:cNvPr id="10" name="Picture 9">
             <a:extLst>
               <a:ext uri="{FF2B5EF4-FFF2-40B4-BE49-F238E27FC236}">
-                <a16:creationId xmlns:a16="http://schemas.microsoft.com/office/drawing/2014/main" id="{5A551BF2-A18B-2D40-875C-C7D561B1F21A}"/>
+                <a16:creationId xmlns:a16="http://schemas.microsoft.com/office/drawing/2014/main" id="{BE8F88AE-BFDB-4290-AB1F-68A7983695C2}"/>
               </a:ext>
             </a:extLst>
           </p:cNvPr>
@@ -6915,7 +7864,7 @@
         </p:blipFill>
         <p:spPr>
           <a:xfrm>
-            <a:off x="2767326" y="4671155"/>
+            <a:off x="2767326" y="4546460"/>
             <a:ext cx="914400" cy="570636"/>
           </a:xfrm>
           <a:prstGeom prst="rect">
@@ -6925,10 +7874,10 @@
       </p:pic>
       <p:pic>
         <p:nvPicPr>
-          <p:cNvPr id="17" name="Picture 16">
+          <p:cNvPr id="12" name="Picture 11">
             <a:extLst>
               <a:ext uri="{FF2B5EF4-FFF2-40B4-BE49-F238E27FC236}">
-                <a16:creationId xmlns:a16="http://schemas.microsoft.com/office/drawing/2014/main" id="{5529F070-D0BF-D644-8E36-08CBCD3E7E87}"/>
+                <a16:creationId xmlns:a16="http://schemas.microsoft.com/office/drawing/2014/main" id="{B4C8378F-63AB-4822-9A02-8132F3DE065A}"/>
               </a:ext>
             </a:extLst>
           </p:cNvPr>
@@ -6944,7 +7893,7 @@
         </p:blipFill>
         <p:spPr>
           <a:xfrm>
-            <a:off x="5361729" y="4665067"/>
+            <a:off x="5361729" y="4540372"/>
             <a:ext cx="990930" cy="570636"/>
           </a:xfrm>
           <a:prstGeom prst="rect">
@@ -6952,94 +7901,10 @@
           </a:prstGeom>
         </p:spPr>
       </p:pic>
-      <p:sp>
-        <p:nvSpPr>
-          <p:cNvPr id="20" name="TextBox 19">
-            <a:extLst>
-              <a:ext uri="{FF2B5EF4-FFF2-40B4-BE49-F238E27FC236}">
-                <a16:creationId xmlns:a16="http://schemas.microsoft.com/office/drawing/2014/main" id="{43ADD5CC-D587-FA4B-8210-C7107590CA15}"/>
-              </a:ext>
-            </a:extLst>
-          </p:cNvPr>
-          <p:cNvSpPr txBox="1"/>
-          <p:nvPr/>
-        </p:nvSpPr>
-        <p:spPr>
-          <a:xfrm>
-            <a:off x="2439699" y="3200968"/>
-            <a:ext cx="1560220" cy="1415772"/>
-          </a:xfrm>
-          <a:prstGeom prst="rect">
-            <a:avLst/>
-          </a:prstGeom>
-          <a:noFill/>
-          <a:ln w="31750">
-            <a:solidFill>
-              <a:schemeClr val="tx1"/>
-            </a:solidFill>
-          </a:ln>
-        </p:spPr>
-        <p:txBody>
-          <a:bodyPr wrap="square" rtlCol="0">
-            <a:spAutoFit/>
-          </a:bodyPr>
-          <a:lstStyle/>
-          <a:p>
-            <a:pPr algn="ctr"/>
-            <a:endParaRPr lang="en-US" sz="800" dirty="0"/>
-          </a:p>
-          <a:p>
-            <a:pPr algn="ctr"/>
-            <a:endParaRPr lang="en-US" sz="1400" dirty="0"/>
-          </a:p>
-          <a:p>
-            <a:pPr algn="ctr"/>
-            <a:r>
-              <a:rPr lang="en-US" sz="1400" dirty="0"/>
-              <a:t>6</a:t>
-            </a:r>
-          </a:p>
-          <a:p>
-            <a:pPr algn="ctr"/>
-            <a:r>
-              <a:rPr lang="en-US" sz="1400" b="1" dirty="0">
-                <a:solidFill>
-                  <a:srgbClr val="1B1CD7"/>
-                </a:solidFill>
-              </a:rPr>
-              <a:t>matching</a:t>
-            </a:r>
-          </a:p>
-          <a:p>
-            <a:pPr algn="ctr"/>
-            <a:endParaRPr lang="en-US" sz="1400" b="1" dirty="0">
-              <a:solidFill>
-                <a:srgbClr val="1B1CD7"/>
-              </a:solidFill>
-            </a:endParaRPr>
-          </a:p>
-          <a:p>
-            <a:pPr algn="ctr"/>
-            <a:endParaRPr lang="en-US" sz="1400" b="1" dirty="0">
-              <a:solidFill>
-                <a:srgbClr val="1B1CD7"/>
-              </a:solidFill>
-            </a:endParaRPr>
-          </a:p>
-          <a:p>
-            <a:pPr algn="ctr"/>
-            <a:endParaRPr lang="en-US" sz="800" dirty="0">
-              <a:solidFill>
-                <a:srgbClr val="F8A60F"/>
-              </a:solidFill>
-            </a:endParaRPr>
-          </a:p>
-        </p:txBody>
-      </p:sp>
     </p:spTree>
     <p:extLst>
       <p:ext uri="{BB962C8B-B14F-4D97-AF65-F5344CB8AC3E}">
-        <p14:creationId xmlns:p14="http://schemas.microsoft.com/office/powerpoint/2010/main" val="1442581818"/>
+        <p14:creationId xmlns:p14="http://schemas.microsoft.com/office/powerpoint/2010/main" val="3654648193"/>
       </p:ext>
     </p:extLst>
   </p:cSld>
@@ -7091,7 +7956,7 @@
         <p:spPr>
           <a:xfrm>
             <a:off x="823491" y="1387596"/>
-            <a:ext cx="6890091" cy="4530471"/>
+            <a:ext cx="6233566" cy="5736955"/>
           </a:xfrm>
           <a:prstGeom prst="rect">
             <a:avLst/>
@@ -7106,17 +7971,42 @@
           <a:p>
             <a:r>
               <a:rPr lang="en-US" sz="1960" dirty="0"/>
-              <a:t>Once you make your selection, that batch will become highlighted</a:t>
-            </a:r>
-          </a:p>
-          <a:p>
-            <a:endParaRPr lang="en-US" sz="1960" dirty="0"/>
-          </a:p>
-          <a:p>
+              <a:t>Then, the trials for the </a:t>
+            </a:r>
+            <a:r>
+              <a:rPr lang="en-US" sz="1960" b="1" dirty="0"/>
+              <a:t>Oddball Number Game</a:t>
+            </a:r>
+            <a:r>
+              <a:rPr lang="en-US" sz="1960" b="1" i="1" dirty="0"/>
+              <a:t> </a:t>
+            </a:r>
             <a:r>
               <a:rPr lang="en-US" sz="1960" dirty="0"/>
-              <a:t>in green.</a:t>
-            </a:r>
+              <a:t>will begin. </a:t>
+            </a:r>
+          </a:p>
+          <a:p>
+            <a:endParaRPr lang="en-US" sz="1960" dirty="0"/>
+          </a:p>
+          <a:p>
+            <a:r>
+              <a:rPr lang="en-US" sz="1960" dirty="0"/>
+              <a:t>In this example, you would then play 7 matching trials. </a:t>
+            </a:r>
+            <a:endParaRPr lang="en-US" sz="4620" dirty="0"/>
+          </a:p>
+          <a:p>
+            <a:endParaRPr lang="en-US" sz="1960" dirty="0"/>
+          </a:p>
+          <a:p>
+            <a:endParaRPr lang="en-US" sz="1960" dirty="0"/>
+          </a:p>
+          <a:p>
+            <a:endParaRPr lang="en-US" sz="1960" dirty="0"/>
+          </a:p>
+          <a:p>
+            <a:endParaRPr lang="en-US" sz="1960" dirty="0"/>
           </a:p>
           <a:p>
             <a:endParaRPr lang="en-US" sz="1960" dirty="0"/>
@@ -7222,10 +8112,10 @@
       </p:sp>
       <p:sp>
         <p:nvSpPr>
-          <p:cNvPr id="4" name="TextBox 3">
+          <p:cNvPr id="2" name="TextBox 1">
             <a:extLst>
               <a:ext uri="{FF2B5EF4-FFF2-40B4-BE49-F238E27FC236}">
-                <a16:creationId xmlns:a16="http://schemas.microsoft.com/office/drawing/2014/main" id="{F9A30FC6-95B9-4A60-B131-2E6F9192A7CD}"/>
+                <a16:creationId xmlns:a16="http://schemas.microsoft.com/office/drawing/2014/main" id="{9BE1A097-B149-473D-BCFA-CEB1A3106FD2}"/>
               </a:ext>
             </a:extLst>
           </p:cNvPr>
@@ -7234,13 +8124,18 @@
         </p:nvSpPr>
         <p:spPr>
           <a:xfrm>
-            <a:off x="4312260" y="3547723"/>
-            <a:ext cx="914400" cy="1077218"/>
+            <a:off x="2439699" y="3602749"/>
+            <a:ext cx="1560220" cy="769441"/>
           </a:xfrm>
           <a:prstGeom prst="rect">
             <a:avLst/>
           </a:prstGeom>
           <a:noFill/>
+          <a:ln w="31750">
+            <a:solidFill>
+              <a:srgbClr val="00AB36"/>
+            </a:solidFill>
+          </a:ln>
         </p:spPr>
         <p:txBody>
           <a:bodyPr wrap="square" rtlCol="0">
@@ -7248,22 +8143,48 @@
           </a:bodyPr>
           <a:lstStyle/>
           <a:p>
-            <a:r>
-              <a:rPr lang="en-US" sz="4600" dirty="0"/>
-              <a:t>+</a:t>
-            </a:r>
-          </a:p>
-          <a:p>
-            <a:endParaRPr lang="en-US" dirty="0"/>
-          </a:p>
-        </p:txBody>
-      </p:sp>
-      <p:sp>
-        <p:nvSpPr>
-          <p:cNvPr id="8" name="TextBox 7">
+            <a:pPr algn="ctr"/>
+            <a:endParaRPr lang="en-US" sz="800" dirty="0"/>
+          </a:p>
+          <a:p>
+            <a:pPr algn="ctr"/>
+            <a:r>
+              <a:rPr lang="en-US" sz="1400" dirty="0"/>
+              <a:t>7</a:t>
+            </a:r>
+          </a:p>
+          <a:p>
+            <a:pPr algn="ctr"/>
+            <a:r>
+              <a:rPr lang="en-US" sz="1400" b="1" dirty="0">
+                <a:solidFill>
+                  <a:srgbClr val="1B1CD7"/>
+                </a:solidFill>
+              </a:rPr>
+              <a:t>matching</a:t>
+            </a:r>
+            <a:endParaRPr lang="en-US" sz="1400" b="1" dirty="0">
+              <a:solidFill>
+                <a:srgbClr val="F8A60F"/>
+              </a:solidFill>
+            </a:endParaRPr>
+          </a:p>
+          <a:p>
+            <a:pPr algn="ctr"/>
+            <a:endParaRPr lang="en-US" sz="800" dirty="0">
+              <a:solidFill>
+                <a:srgbClr val="F8A60F"/>
+              </a:solidFill>
+            </a:endParaRPr>
+          </a:p>
+        </p:txBody>
+      </p:sp>
+      <p:sp>
+        <p:nvSpPr>
+          <p:cNvPr id="7" name="TextBox 6">
             <a:extLst>
               <a:ext uri="{FF2B5EF4-FFF2-40B4-BE49-F238E27FC236}">
-                <a16:creationId xmlns:a16="http://schemas.microsoft.com/office/drawing/2014/main" id="{176BCA7B-DF07-434D-B61E-1D85D7125009}"/>
+                <a16:creationId xmlns:a16="http://schemas.microsoft.com/office/drawing/2014/main" id="{011136B3-76D7-48E2-A086-F50791BBCE5A}"/>
               </a:ext>
             </a:extLst>
           </p:cNvPr>
@@ -7272,72 +8193,8 @@
         </p:nvSpPr>
         <p:spPr>
           <a:xfrm>
-            <a:off x="4114800" y="3217984"/>
-            <a:ext cx="914400" cy="914400"/>
-          </a:xfrm>
-          <a:prstGeom prst="rect">
-            <a:avLst/>
-          </a:prstGeom>
-          <a:noFill/>
-        </p:spPr>
-        <p:txBody>
-          <a:bodyPr wrap="square" rtlCol="0">
-            <a:spAutoFit/>
-          </a:bodyPr>
-          <a:lstStyle/>
-          <a:p>
-            <a:endParaRPr lang="en-US" dirty="0"/>
-          </a:p>
-        </p:txBody>
-      </p:sp>
-      <p:sp>
-        <p:nvSpPr>
-          <p:cNvPr id="9" name="TextBox 8">
-            <a:extLst>
-              <a:ext uri="{FF2B5EF4-FFF2-40B4-BE49-F238E27FC236}">
-                <a16:creationId xmlns:a16="http://schemas.microsoft.com/office/drawing/2014/main" id="{09BA4E5D-4B17-4FB7-AAF1-0DBE8CCCFD80}"/>
-              </a:ext>
-            </a:extLst>
-          </p:cNvPr>
-          <p:cNvSpPr txBox="1"/>
-          <p:nvPr/>
-        </p:nvSpPr>
-        <p:spPr>
-          <a:xfrm>
-            <a:off x="4114800" y="3217984"/>
-            <a:ext cx="914400" cy="914400"/>
-          </a:xfrm>
-          <a:prstGeom prst="rect">
-            <a:avLst/>
-          </a:prstGeom>
-          <a:noFill/>
-        </p:spPr>
-        <p:txBody>
-          <a:bodyPr wrap="square" rtlCol="0">
-            <a:spAutoFit/>
-          </a:bodyPr>
-          <a:lstStyle/>
-          <a:p>
-            <a:endParaRPr lang="en-US" dirty="0"/>
-          </a:p>
-        </p:txBody>
-      </p:sp>
-      <p:sp>
-        <p:nvSpPr>
-          <p:cNvPr id="18" name="TextBox 17">
-            <a:extLst>
-              <a:ext uri="{FF2B5EF4-FFF2-40B4-BE49-F238E27FC236}">
-                <a16:creationId xmlns:a16="http://schemas.microsoft.com/office/drawing/2014/main" id="{2BC8AFA6-811F-244A-AC4A-8B3DBF11FCFC}"/>
-              </a:ext>
-            </a:extLst>
-          </p:cNvPr>
-          <p:cNvSpPr txBox="1"/>
-          <p:nvPr/>
-        </p:nvSpPr>
-        <p:spPr>
-          <a:xfrm>
-            <a:off x="2439699" y="3200968"/>
-            <a:ext cx="1560220" cy="1415772"/>
+            <a:off x="5144083" y="3582892"/>
+            <a:ext cx="1560220" cy="769441"/>
           </a:xfrm>
           <a:prstGeom prst="rect">
             <a:avLst/>
@@ -7360,90 +8217,6 @@
           </a:p>
           <a:p>
             <a:pPr algn="ctr"/>
-            <a:endParaRPr lang="en-US" sz="1400" dirty="0"/>
-          </a:p>
-          <a:p>
-            <a:pPr algn="ctr"/>
-            <a:r>
-              <a:rPr lang="en-US" sz="1400" dirty="0"/>
-              <a:t>6</a:t>
-            </a:r>
-          </a:p>
-          <a:p>
-            <a:pPr algn="ctr"/>
-            <a:r>
-              <a:rPr lang="en-US" sz="1400" b="1" dirty="0">
-                <a:solidFill>
-                  <a:srgbClr val="1B1CD7"/>
-                </a:solidFill>
-              </a:rPr>
-              <a:t>matching</a:t>
-            </a:r>
-          </a:p>
-          <a:p>
-            <a:pPr algn="ctr"/>
-            <a:endParaRPr lang="en-US" sz="1400" b="1" dirty="0">
-              <a:solidFill>
-                <a:srgbClr val="1B1CD7"/>
-              </a:solidFill>
-            </a:endParaRPr>
-          </a:p>
-          <a:p>
-            <a:pPr algn="ctr"/>
-            <a:endParaRPr lang="en-US" sz="1400" b="1" dirty="0">
-              <a:solidFill>
-                <a:srgbClr val="1B1CD7"/>
-              </a:solidFill>
-            </a:endParaRPr>
-          </a:p>
-          <a:p>
-            <a:pPr algn="ctr"/>
-            <a:endParaRPr lang="en-US" sz="800" dirty="0">
-              <a:solidFill>
-                <a:srgbClr val="F8A60F"/>
-              </a:solidFill>
-            </a:endParaRPr>
-          </a:p>
-        </p:txBody>
-      </p:sp>
-      <p:sp>
-        <p:nvSpPr>
-          <p:cNvPr id="19" name="TextBox 18">
-            <a:extLst>
-              <a:ext uri="{FF2B5EF4-FFF2-40B4-BE49-F238E27FC236}">
-                <a16:creationId xmlns:a16="http://schemas.microsoft.com/office/drawing/2014/main" id="{CA19EFA9-2D35-3A49-BD07-00AD26FDD555}"/>
-              </a:ext>
-            </a:extLst>
-          </p:cNvPr>
-          <p:cNvSpPr txBox="1"/>
-          <p:nvPr/>
-        </p:nvSpPr>
-        <p:spPr>
-          <a:xfrm>
-            <a:off x="5226660" y="3200968"/>
-            <a:ext cx="1560220" cy="1415772"/>
-          </a:xfrm>
-          <a:prstGeom prst="rect">
-            <a:avLst/>
-          </a:prstGeom>
-          <a:noFill/>
-          <a:ln w="31750">
-            <a:solidFill>
-              <a:srgbClr val="00AB36"/>
-            </a:solidFill>
-          </a:ln>
-        </p:spPr>
-        <p:txBody>
-          <a:bodyPr wrap="square" rtlCol="0">
-            <a:spAutoFit/>
-          </a:bodyPr>
-          <a:lstStyle/>
-          <a:p>
-            <a:pPr algn="ctr"/>
-            <a:endParaRPr lang="en-US" sz="800" dirty="0"/>
-          </a:p>
-          <a:p>
-            <a:pPr algn="ctr"/>
             <a:r>
               <a:rPr lang="en-US" sz="1400" dirty="0"/>
               <a:t>2</a:t>
@@ -7459,471 +8232,6 @@
               </a:rPr>
               <a:t>mismatching</a:t>
             </a:r>
-          </a:p>
-          <a:p>
-            <a:pPr algn="ctr"/>
-            <a:r>
-              <a:rPr lang="en-US" sz="1400" dirty="0"/>
-              <a:t>&amp;</a:t>
-            </a:r>
-          </a:p>
-          <a:p>
-            <a:pPr algn="ctr"/>
-            <a:r>
-              <a:rPr lang="en-US" sz="1400" dirty="0"/>
-              <a:t>4 </a:t>
-            </a:r>
-          </a:p>
-          <a:p>
-            <a:pPr algn="ctr"/>
-            <a:r>
-              <a:rPr lang="en-US" sz="1400" b="1" dirty="0">
-                <a:solidFill>
-                  <a:srgbClr val="1B1CD7"/>
-                </a:solidFill>
-              </a:rPr>
-              <a:t>matching</a:t>
-            </a:r>
-            <a:endParaRPr lang="en-US" sz="1400" b="1" dirty="0">
-              <a:solidFill>
-                <a:srgbClr val="F8A60F"/>
-              </a:solidFill>
-            </a:endParaRPr>
-          </a:p>
-          <a:p>
-            <a:pPr algn="ctr"/>
-            <a:endParaRPr lang="en-US" sz="800" dirty="0">
-              <a:solidFill>
-                <a:srgbClr val="F8A60F"/>
-              </a:solidFill>
-            </a:endParaRPr>
-          </a:p>
-        </p:txBody>
-      </p:sp>
-      <p:pic>
-        <p:nvPicPr>
-          <p:cNvPr id="20" name="Picture 19">
-            <a:extLst>
-              <a:ext uri="{FF2B5EF4-FFF2-40B4-BE49-F238E27FC236}">
-                <a16:creationId xmlns:a16="http://schemas.microsoft.com/office/drawing/2014/main" id="{8E9F8FD3-C8B3-AF42-8753-4628EFE1CBAE}"/>
-              </a:ext>
-            </a:extLst>
-          </p:cNvPr>
-          <p:cNvPicPr>
-            <a:picLocks noChangeAspect="1"/>
-          </p:cNvPicPr>
-          <p:nvPr/>
-        </p:nvPicPr>
-        <p:blipFill rotWithShape="1">
-          <a:blip r:embed="rId3"/>
-          <a:srcRect l="9006" t="73963" r="73248"/>
-          <a:stretch/>
-        </p:blipFill>
-        <p:spPr>
-          <a:xfrm>
-            <a:off x="2767326" y="4671155"/>
-            <a:ext cx="914400" cy="570636"/>
-          </a:xfrm>
-          <a:prstGeom prst="rect">
-            <a:avLst/>
-          </a:prstGeom>
-        </p:spPr>
-      </p:pic>
-      <p:pic>
-        <p:nvPicPr>
-          <p:cNvPr id="21" name="Picture 20">
-            <a:extLst>
-              <a:ext uri="{FF2B5EF4-FFF2-40B4-BE49-F238E27FC236}">
-                <a16:creationId xmlns:a16="http://schemas.microsoft.com/office/drawing/2014/main" id="{186E41B2-DE2D-C24D-9398-E7FB6C07D56E}"/>
-              </a:ext>
-            </a:extLst>
-          </p:cNvPr>
-          <p:cNvPicPr>
-            <a:picLocks noChangeAspect="1"/>
-          </p:cNvPicPr>
-          <p:nvPr/>
-        </p:nvPicPr>
-        <p:blipFill rotWithShape="1">
-          <a:blip r:embed="rId3"/>
-          <a:srcRect l="70615" t="73963" r="10154"/>
-          <a:stretch/>
-        </p:blipFill>
-        <p:spPr>
-          <a:xfrm>
-            <a:off x="5361729" y="4665067"/>
-            <a:ext cx="990930" cy="570636"/>
-          </a:xfrm>
-          <a:prstGeom prst="rect">
-            <a:avLst/>
-          </a:prstGeom>
-        </p:spPr>
-      </p:pic>
-    </p:spTree>
-    <p:extLst>
-      <p:ext uri="{BB962C8B-B14F-4D97-AF65-F5344CB8AC3E}">
-        <p14:creationId xmlns:p14="http://schemas.microsoft.com/office/powerpoint/2010/main" val="3654648193"/>
-      </p:ext>
-    </p:extLst>
-  </p:cSld>
-  <p:clrMapOvr>
-    <a:masterClrMapping/>
-  </p:clrMapOvr>
-</p:sld>
-</file>
-
-<file path=ppt/slides/slide6.xml><?xml version="1.0" encoding="utf-8"?>
-<p:sld xmlns:a="http://schemas.openxmlformats.org/drawingml/2006/main" xmlns:r="http://schemas.openxmlformats.org/officeDocument/2006/relationships" xmlns:p="http://schemas.openxmlformats.org/presentationml/2006/main">
-  <p:cSld>
-    <p:bg>
-      <p:bgPr>
-        <a:solidFill>
-          <a:schemeClr val="bg2">
-            <a:lumMod val="75000"/>
-          </a:schemeClr>
-        </a:solidFill>
-        <a:effectLst/>
-      </p:bgPr>
-    </p:bg>
-    <p:spTree>
-      <p:nvGrpSpPr>
-        <p:cNvPr id="1" name=""/>
-        <p:cNvGrpSpPr/>
-        <p:nvPr/>
-      </p:nvGrpSpPr>
-      <p:grpSpPr>
-        <a:xfrm>
-          <a:off x="0" y="0"/>
-          <a:ext cx="0" cy="0"/>
-          <a:chOff x="0" y="0"/>
-          <a:chExt cx="0" cy="0"/>
-        </a:xfrm>
-      </p:grpSpPr>
-      <p:sp>
-        <p:nvSpPr>
-          <p:cNvPr id="3" name="Tekstvak 5">
-            <a:extLst>
-              <a:ext uri="{FF2B5EF4-FFF2-40B4-BE49-F238E27FC236}">
-                <a16:creationId xmlns:a16="http://schemas.microsoft.com/office/drawing/2014/main" id="{BF228A72-8E27-4D93-959C-DF1E03FD1657}"/>
-              </a:ext>
-            </a:extLst>
-          </p:cNvPr>
-          <p:cNvSpPr txBox="1"/>
-          <p:nvPr/>
-        </p:nvSpPr>
-        <p:spPr>
-          <a:xfrm>
-            <a:off x="823491" y="1387596"/>
-            <a:ext cx="8084982" cy="5736955"/>
-          </a:xfrm>
-          <a:prstGeom prst="rect">
-            <a:avLst/>
-          </a:prstGeom>
-          <a:noFill/>
-        </p:spPr>
-        <p:txBody>
-          <a:bodyPr wrap="square" rtlCol="0">
-            <a:spAutoFit/>
-          </a:bodyPr>
-          <a:lstStyle/>
-          <a:p>
-            <a:r>
-              <a:rPr lang="en-US" sz="1960" dirty="0"/>
-              <a:t>Then, the trials for the </a:t>
-            </a:r>
-            <a:r>
-              <a:rPr lang="en-US" sz="1960" b="1" dirty="0"/>
-              <a:t>Oddball Number Game</a:t>
-            </a:r>
-            <a:r>
-              <a:rPr lang="en-US" sz="1960" b="1" i="1" dirty="0"/>
-              <a:t> </a:t>
-            </a:r>
-            <a:r>
-              <a:rPr lang="en-US" sz="1960" dirty="0"/>
-              <a:t>will begin. </a:t>
-            </a:r>
-          </a:p>
-          <a:p>
-            <a:endParaRPr lang="en-US" sz="1960" dirty="0"/>
-          </a:p>
-          <a:p>
-            <a:r>
-              <a:rPr lang="en-US" sz="1960" dirty="0"/>
-              <a:t>In this example, you would play 3 matching trials and 2 mismatching trials. </a:t>
-            </a:r>
-            <a:endParaRPr lang="en-US" sz="4620" dirty="0"/>
-          </a:p>
-          <a:p>
-            <a:endParaRPr lang="en-US" sz="1960" dirty="0"/>
-          </a:p>
-          <a:p>
-            <a:endParaRPr lang="en-US" sz="1960" dirty="0"/>
-          </a:p>
-          <a:p>
-            <a:endParaRPr lang="en-US" sz="1960" dirty="0"/>
-          </a:p>
-          <a:p>
-            <a:endParaRPr lang="en-US" sz="1960" dirty="0"/>
-          </a:p>
-          <a:p>
-            <a:endParaRPr lang="en-US" sz="1960" dirty="0"/>
-          </a:p>
-          <a:p>
-            <a:endParaRPr lang="en-US" sz="1960" dirty="0"/>
-          </a:p>
-          <a:p>
-            <a:endParaRPr lang="en-US" sz="1960" dirty="0"/>
-          </a:p>
-          <a:p>
-            <a:endParaRPr lang="en-US" sz="1960" dirty="0"/>
-          </a:p>
-          <a:p>
-            <a:endParaRPr lang="en-US" sz="1960" dirty="0"/>
-          </a:p>
-          <a:p>
-            <a:endParaRPr lang="en-US" sz="1960" dirty="0"/>
-          </a:p>
-          <a:p>
-            <a:pPr algn="ctr"/>
-            <a:endParaRPr lang="en-US" sz="1960" dirty="0"/>
-          </a:p>
-          <a:p>
-            <a:pPr algn="ctr"/>
-            <a:endParaRPr lang="en-US" sz="4620" dirty="0"/>
-          </a:p>
-          <a:p>
-            <a:pPr algn="ctr"/>
-            <a:endParaRPr lang="en-US" sz="4620" dirty="0"/>
-          </a:p>
-        </p:txBody>
-      </p:sp>
-      <p:sp>
-        <p:nvSpPr>
-          <p:cNvPr id="6" name="Tekstvak 5">
-            <a:extLst>
-              <a:ext uri="{FF2B5EF4-FFF2-40B4-BE49-F238E27FC236}">
-                <a16:creationId xmlns:a16="http://schemas.microsoft.com/office/drawing/2014/main" id="{A7D3FBCB-F6A3-4FA7-A179-58C1665B6DFD}"/>
-              </a:ext>
-            </a:extLst>
-          </p:cNvPr>
-          <p:cNvSpPr txBox="1"/>
-          <p:nvPr/>
-        </p:nvSpPr>
-        <p:spPr>
-          <a:xfrm>
-            <a:off x="2127358" y="2510291"/>
-            <a:ext cx="4889283" cy="2914644"/>
-          </a:xfrm>
-          <a:prstGeom prst="rect">
-            <a:avLst/>
-          </a:prstGeom>
-          <a:solidFill>
-            <a:schemeClr val="bg1"/>
-          </a:solidFill>
-        </p:spPr>
-        <p:txBody>
-          <a:bodyPr wrap="square" rtlCol="0">
-            <a:spAutoFit/>
-          </a:bodyPr>
-          <a:lstStyle/>
-          <a:p>
-            <a:pPr algn="ctr"/>
-            <a:endParaRPr lang="en-US" sz="1960" dirty="0"/>
-          </a:p>
-          <a:p>
-            <a:pPr algn="ctr"/>
-            <a:endParaRPr lang="en-US" sz="1960" dirty="0"/>
-          </a:p>
-          <a:p>
-            <a:pPr algn="ctr"/>
-            <a:endParaRPr lang="en-US" sz="1960" dirty="0"/>
-          </a:p>
-          <a:p>
-            <a:pPr algn="ctr"/>
-            <a:r>
-              <a:rPr lang="en-US" sz="4620" dirty="0">
-                <a:solidFill>
-                  <a:schemeClr val="bg1"/>
-                </a:solidFill>
-              </a:rPr>
-              <a:t>+</a:t>
-            </a:r>
-          </a:p>
-          <a:p>
-            <a:pPr algn="ctr"/>
-            <a:endParaRPr lang="en-US" sz="1960" dirty="0"/>
-          </a:p>
-          <a:p>
-            <a:endParaRPr lang="en-US" sz="1960" dirty="0"/>
-          </a:p>
-          <a:p>
-            <a:r>
-              <a:rPr lang="en-US" sz="1960" dirty="0"/>
-              <a:t> </a:t>
-            </a:r>
-          </a:p>
-          <a:p>
-            <a:endParaRPr lang="en-US" sz="1960" dirty="0"/>
-          </a:p>
-        </p:txBody>
-      </p:sp>
-      <p:sp>
-        <p:nvSpPr>
-          <p:cNvPr id="2" name="TextBox 1">
-            <a:extLst>
-              <a:ext uri="{FF2B5EF4-FFF2-40B4-BE49-F238E27FC236}">
-                <a16:creationId xmlns:a16="http://schemas.microsoft.com/office/drawing/2014/main" id="{9BE1A097-B149-473D-BCFA-CEB1A3106FD2}"/>
-              </a:ext>
-            </a:extLst>
-          </p:cNvPr>
-          <p:cNvSpPr txBox="1"/>
-          <p:nvPr/>
-        </p:nvSpPr>
-        <p:spPr>
-          <a:xfrm>
-            <a:off x="2439699" y="3131693"/>
-            <a:ext cx="1560220" cy="1415772"/>
-          </a:xfrm>
-          <a:prstGeom prst="rect">
-            <a:avLst/>
-          </a:prstGeom>
-          <a:noFill/>
-          <a:ln w="31750">
-            <a:solidFill>
-              <a:srgbClr val="00AB36"/>
-            </a:solidFill>
-          </a:ln>
-        </p:spPr>
-        <p:txBody>
-          <a:bodyPr wrap="square" rtlCol="0">
-            <a:spAutoFit/>
-          </a:bodyPr>
-          <a:lstStyle/>
-          <a:p>
-            <a:pPr algn="ctr"/>
-            <a:endParaRPr lang="en-US" sz="800" dirty="0"/>
-          </a:p>
-          <a:p>
-            <a:pPr algn="ctr"/>
-            <a:r>
-              <a:rPr lang="en-US" sz="1400" dirty="0"/>
-              <a:t>3</a:t>
-            </a:r>
-          </a:p>
-          <a:p>
-            <a:pPr algn="ctr"/>
-            <a:r>
-              <a:rPr lang="en-US" sz="1400" b="1" dirty="0">
-                <a:solidFill>
-                  <a:srgbClr val="1B1CD7"/>
-                </a:solidFill>
-              </a:rPr>
-              <a:t>matching</a:t>
-            </a:r>
-          </a:p>
-          <a:p>
-            <a:pPr algn="ctr"/>
-            <a:r>
-              <a:rPr lang="en-US" sz="1400" dirty="0"/>
-              <a:t>&amp;</a:t>
-            </a:r>
-          </a:p>
-          <a:p>
-            <a:pPr algn="ctr"/>
-            <a:r>
-              <a:rPr lang="en-US" sz="1400" dirty="0"/>
-              <a:t>2</a:t>
-            </a:r>
-          </a:p>
-          <a:p>
-            <a:pPr algn="ctr"/>
-            <a:r>
-              <a:rPr lang="en-US" sz="1400" b="1" dirty="0">
-                <a:solidFill>
-                  <a:srgbClr val="F8A60F"/>
-                </a:solidFill>
-              </a:rPr>
-              <a:t>mismatching</a:t>
-            </a:r>
-          </a:p>
-          <a:p>
-            <a:pPr algn="ctr"/>
-            <a:endParaRPr lang="en-US" sz="800" dirty="0">
-              <a:solidFill>
-                <a:srgbClr val="F8A60F"/>
-              </a:solidFill>
-            </a:endParaRPr>
-          </a:p>
-        </p:txBody>
-      </p:sp>
-      <p:sp>
-        <p:nvSpPr>
-          <p:cNvPr id="7" name="TextBox 6">
-            <a:extLst>
-              <a:ext uri="{FF2B5EF4-FFF2-40B4-BE49-F238E27FC236}">
-                <a16:creationId xmlns:a16="http://schemas.microsoft.com/office/drawing/2014/main" id="{011136B3-76D7-48E2-A086-F50791BBCE5A}"/>
-              </a:ext>
-            </a:extLst>
-          </p:cNvPr>
-          <p:cNvSpPr txBox="1"/>
-          <p:nvPr/>
-        </p:nvSpPr>
-        <p:spPr>
-          <a:xfrm>
-            <a:off x="5195006" y="3131693"/>
-            <a:ext cx="1560220" cy="1415772"/>
-          </a:xfrm>
-          <a:prstGeom prst="rect">
-            <a:avLst/>
-          </a:prstGeom>
-          <a:noFill/>
-          <a:ln w="31750">
-            <a:solidFill>
-              <a:schemeClr val="tx1"/>
-            </a:solidFill>
-          </a:ln>
-        </p:spPr>
-        <p:txBody>
-          <a:bodyPr wrap="square" rtlCol="0">
-            <a:spAutoFit/>
-          </a:bodyPr>
-          <a:lstStyle/>
-          <a:p>
-            <a:pPr algn="ctr"/>
-            <a:endParaRPr lang="en-US" sz="800" dirty="0"/>
-          </a:p>
-          <a:p>
-            <a:pPr algn="ctr"/>
-            <a:endParaRPr lang="en-US" sz="1400" dirty="0"/>
-          </a:p>
-          <a:p>
-            <a:pPr algn="ctr"/>
-            <a:r>
-              <a:rPr lang="en-US" sz="1400" dirty="0"/>
-              <a:t>5</a:t>
-            </a:r>
-          </a:p>
-          <a:p>
-            <a:pPr algn="ctr"/>
-            <a:r>
-              <a:rPr lang="en-US" sz="1400" b="1" dirty="0">
-                <a:solidFill>
-                  <a:srgbClr val="1B1CD7"/>
-                </a:solidFill>
-              </a:rPr>
-              <a:t>matching</a:t>
-            </a:r>
-          </a:p>
-          <a:p>
-            <a:pPr algn="ctr"/>
-            <a:endParaRPr lang="en-US" sz="1400" b="1" dirty="0">
-              <a:solidFill>
-                <a:srgbClr val="1B1CD7"/>
-              </a:solidFill>
-            </a:endParaRPr>
-          </a:p>
-          <a:p>
-            <a:pPr algn="ctr"/>
             <a:endParaRPr lang="en-US" sz="1400" b="1" dirty="0">
               <a:solidFill>
                 <a:srgbClr val="1B1CD7"/>
@@ -8063,7 +8371,7 @@
         </p:blipFill>
         <p:spPr>
           <a:xfrm>
-            <a:off x="2767326" y="4574170"/>
+            <a:off x="2767326" y="4546460"/>
             <a:ext cx="914400" cy="570636"/>
           </a:xfrm>
           <a:prstGeom prst="rect">
@@ -8092,7 +8400,7 @@
         </p:blipFill>
         <p:spPr>
           <a:xfrm>
-            <a:off x="5361729" y="4575009"/>
+            <a:off x="5361729" y="4540372"/>
             <a:ext cx="990930" cy="570636"/>
           </a:xfrm>
           <a:prstGeom prst="rect">
@@ -8113,7 +8421,7 @@
 </p:sld>
 </file>
 
-<file path=ppt/slides/slide7.xml><?xml version="1.0" encoding="utf-8"?>
+<file path=ppt/slides/slide6.xml><?xml version="1.0" encoding="utf-8"?>
 <p:sld xmlns:a="http://schemas.openxmlformats.org/drawingml/2006/main" xmlns:r="http://schemas.openxmlformats.org/officeDocument/2006/relationships" xmlns:p="http://schemas.openxmlformats.org/presentationml/2006/main">
   <p:cSld>
     <p:bg>
@@ -8625,6 +8933,122 @@
 </p:sld>
 </file>
 
+<file path=ppt/slides/slide7.xml><?xml version="1.0" encoding="utf-8"?>
+<p:sld xmlns:a="http://schemas.openxmlformats.org/drawingml/2006/main" xmlns:r="http://schemas.openxmlformats.org/officeDocument/2006/relationships" xmlns:p="http://schemas.openxmlformats.org/presentationml/2006/main">
+  <p:cSld>
+    <p:bg>
+      <p:bgPr>
+        <a:solidFill>
+          <a:schemeClr val="bg2">
+            <a:lumMod val="75000"/>
+          </a:schemeClr>
+        </a:solidFill>
+        <a:effectLst/>
+      </p:bgPr>
+    </p:bg>
+    <p:spTree>
+      <p:nvGrpSpPr>
+        <p:cNvPr id="1" name=""/>
+        <p:cNvGrpSpPr/>
+        <p:nvPr/>
+      </p:nvGrpSpPr>
+      <p:grpSpPr>
+        <a:xfrm>
+          <a:off x="0" y="0"/>
+          <a:ext cx="0" cy="0"/>
+          <a:chOff x="0" y="0"/>
+          <a:chExt cx="0" cy="0"/>
+        </a:xfrm>
+      </p:grpSpPr>
+      <p:sp>
+        <p:nvSpPr>
+          <p:cNvPr id="3" name="Tekstvak 5">
+            <a:extLst>
+              <a:ext uri="{FF2B5EF4-FFF2-40B4-BE49-F238E27FC236}">
+                <a16:creationId xmlns:a16="http://schemas.microsoft.com/office/drawing/2014/main" id="{BF228A72-8E27-4D93-959C-DF1E03FD1657}"/>
+              </a:ext>
+            </a:extLst>
+          </p:cNvPr>
+          <p:cNvSpPr txBox="1"/>
+          <p:nvPr/>
+        </p:nvSpPr>
+        <p:spPr>
+          <a:xfrm>
+            <a:off x="823491" y="1387596"/>
+            <a:ext cx="7760201" cy="2806922"/>
+          </a:xfrm>
+          <a:prstGeom prst="rect">
+            <a:avLst/>
+          </a:prstGeom>
+          <a:noFill/>
+        </p:spPr>
+        <p:txBody>
+          <a:bodyPr wrap="none" rtlCol="0">
+            <a:spAutoFit/>
+          </a:bodyPr>
+          <a:lstStyle/>
+          <a:p>
+            <a:r>
+              <a:rPr lang="en-US" sz="1960" dirty="0"/>
+              <a:t>When you choose a batch in the </a:t>
+            </a:r>
+            <a:r>
+              <a:rPr lang="en-US" sz="1960" b="1" dirty="0"/>
+              <a:t>Batch Choice Game, </a:t>
+            </a:r>
+            <a:r>
+              <a:rPr lang="en-US" sz="1960" dirty="0"/>
+              <a:t>sometimes you must </a:t>
+            </a:r>
+          </a:p>
+          <a:p>
+            <a:endParaRPr lang="en-US" sz="1960" dirty="0"/>
+          </a:p>
+          <a:p>
+            <a:r>
+              <a:rPr lang="en-US" sz="1960" dirty="0"/>
+              <a:t>complete the number of selected trials. </a:t>
+            </a:r>
+          </a:p>
+          <a:p>
+            <a:endParaRPr lang="en-US" sz="1960" dirty="0"/>
+          </a:p>
+          <a:p>
+            <a:r>
+              <a:rPr lang="en-US" sz="1960" dirty="0"/>
+              <a:t>Other times you will not complete the selected trials and will instead</a:t>
+            </a:r>
+          </a:p>
+          <a:p>
+            <a:endParaRPr lang="en-US" sz="1960" dirty="0"/>
+          </a:p>
+          <a:p>
+            <a:r>
+              <a:rPr lang="en-US" sz="1960" dirty="0"/>
+              <a:t>move on to your next choice. </a:t>
+            </a:r>
+          </a:p>
+          <a:p>
+            <a:endParaRPr lang="en-US" sz="1960" dirty="0"/>
+          </a:p>
+          <a:p>
+            <a:endParaRPr lang="en-US" sz="1960" dirty="0"/>
+          </a:p>
+        </p:txBody>
+      </p:sp>
+    </p:spTree>
+    <p:extLst>
+      <p:ext uri="{BB962C8B-B14F-4D97-AF65-F5344CB8AC3E}">
+        <p14:creationId xmlns:p14="http://schemas.microsoft.com/office/powerpoint/2010/main" val="747114730"/>
+      </p:ext>
+    </p:extLst>
+  </p:cSld>
+  <p:clrMapOvr>
+    <a:masterClrMapping/>
+  </p:clrMapOvr>
+</p:sld>
+</file>
+
 <file path=ppt/slides/slide8.xml><?xml version="1.0" encoding="utf-8"?>
 <p:sld xmlns:a="http://schemas.openxmlformats.org/drawingml/2006/main" xmlns:r="http://schemas.openxmlformats.org/officeDocument/2006/relationships" xmlns:p="http://schemas.openxmlformats.org/presentationml/2006/main">
   <p:cSld>
@@ -8667,7 +9091,7 @@
         <p:spPr>
           <a:xfrm>
             <a:off x="823491" y="1387596"/>
-            <a:ext cx="7760201" cy="2806922"/>
+            <a:ext cx="7558351" cy="4832092"/>
           </a:xfrm>
           <a:prstGeom prst="rect">
             <a:avLst/>
@@ -8682,15 +9106,15 @@
           <a:p>
             <a:r>
               <a:rPr lang="en-US" sz="1960" dirty="0"/>
-              <a:t>When you choose a batch in the </a:t>
+              <a:t>If you </a:t>
             </a:r>
             <a:r>
               <a:rPr lang="en-US" sz="1960" b="1" dirty="0"/>
-              <a:t>Batch Choice Game, </a:t>
+              <a:t>do not have to </a:t>
             </a:r>
             <a:r>
               <a:rPr lang="en-US" sz="1960" dirty="0"/>
-              <a:t>sometimes you must </a:t>
+              <a:t>perform the trials, you will see the message below. </a:t>
             </a:r>
           </a:p>
           <a:p>
@@ -8699,8 +9123,99 @@
           <a:p>
             <a:r>
               <a:rPr lang="en-US" sz="1960" dirty="0"/>
-              <a:t>complete the number of selected trials. </a:t>
-            </a:r>
+              <a:t>Please treat every choice like you will have to complete the trials. </a:t>
+            </a:r>
+          </a:p>
+          <a:p>
+            <a:endParaRPr lang="en-US" sz="1960" dirty="0"/>
+          </a:p>
+          <a:p>
+            <a:endParaRPr lang="en-US" sz="1960" dirty="0"/>
+          </a:p>
+          <a:p>
+            <a:endParaRPr lang="en-US" sz="1960" dirty="0"/>
+          </a:p>
+          <a:p>
+            <a:endParaRPr lang="en-US" sz="1960" dirty="0"/>
+          </a:p>
+          <a:p>
+            <a:endParaRPr lang="en-US" sz="1960" dirty="0"/>
+          </a:p>
+          <a:p>
+            <a:endParaRPr lang="en-US" sz="1960" dirty="0"/>
+          </a:p>
+          <a:p>
+            <a:endParaRPr lang="en-US" sz="1960" dirty="0"/>
+          </a:p>
+          <a:p>
+            <a:pPr algn="ctr"/>
+            <a:endParaRPr lang="en-US" sz="1960" dirty="0"/>
+          </a:p>
+          <a:p>
+            <a:pPr algn="ctr"/>
+            <a:endParaRPr lang="en-US" sz="4620" dirty="0"/>
+          </a:p>
+          <a:p>
+            <a:pPr algn="ctr"/>
+            <a:endParaRPr lang="en-US" sz="4620" dirty="0"/>
+          </a:p>
+        </p:txBody>
+      </p:sp>
+      <p:sp>
+        <p:nvSpPr>
+          <p:cNvPr id="6" name="Tekstvak 5">
+            <a:extLst>
+              <a:ext uri="{FF2B5EF4-FFF2-40B4-BE49-F238E27FC236}">
+                <a16:creationId xmlns:a16="http://schemas.microsoft.com/office/drawing/2014/main" id="{A7D3FBCB-F6A3-4FA7-A179-58C1665B6DFD}"/>
+              </a:ext>
+            </a:extLst>
+          </p:cNvPr>
+          <p:cNvSpPr txBox="1"/>
+          <p:nvPr/>
+        </p:nvSpPr>
+        <p:spPr>
+          <a:xfrm>
+            <a:off x="2127358" y="2510291"/>
+            <a:ext cx="4889283" cy="2914644"/>
+          </a:xfrm>
+          <a:prstGeom prst="rect">
+            <a:avLst/>
+          </a:prstGeom>
+          <a:solidFill>
+            <a:schemeClr val="bg1"/>
+          </a:solidFill>
+        </p:spPr>
+        <p:txBody>
+          <a:bodyPr wrap="square" rtlCol="0">
+            <a:spAutoFit/>
+          </a:bodyPr>
+          <a:lstStyle/>
+          <a:p>
+            <a:pPr algn="ctr"/>
+            <a:endParaRPr lang="en-US" sz="1960" dirty="0"/>
+          </a:p>
+          <a:p>
+            <a:pPr algn="ctr"/>
+            <a:endParaRPr lang="en-US" sz="1960" dirty="0"/>
+          </a:p>
+          <a:p>
+            <a:pPr algn="ctr"/>
+            <a:endParaRPr lang="en-US" sz="1960" dirty="0"/>
+          </a:p>
+          <a:p>
+            <a:pPr algn="ctr"/>
+            <a:r>
+              <a:rPr lang="en-US" sz="4620" dirty="0">
+                <a:solidFill>
+                  <a:schemeClr val="bg1"/>
+                </a:solidFill>
+              </a:rPr>
+              <a:t>+</a:t>
+            </a:r>
+          </a:p>
+          <a:p>
+            <a:pPr algn="ctr"/>
+            <a:endParaRPr lang="en-US" sz="1960" dirty="0"/>
           </a:p>
           <a:p>
             <a:endParaRPr lang="en-US" sz="1960" dirty="0"/>
@@ -8708,30 +9223,104 @@
           <a:p>
             <a:r>
               <a:rPr lang="en-US" sz="1960" dirty="0"/>
-              <a:t>Other times you will not complete the selected trials and will instead</a:t>
-            </a:r>
-          </a:p>
-          <a:p>
-            <a:endParaRPr lang="en-US" sz="1960" dirty="0"/>
-          </a:p>
-          <a:p>
-            <a:r>
-              <a:rPr lang="en-US" sz="1960" dirty="0"/>
-              <a:t>move on to your next choice. </a:t>
-            </a:r>
-          </a:p>
-          <a:p>
-            <a:endParaRPr lang="en-US" sz="1960" dirty="0"/>
-          </a:p>
-          <a:p>
-            <a:endParaRPr lang="en-US" sz="1960" dirty="0"/>
+              <a:t> </a:t>
+            </a:r>
+          </a:p>
+          <a:p>
+            <a:endParaRPr lang="en-US" sz="1960" dirty="0"/>
+          </a:p>
+        </p:txBody>
+      </p:sp>
+      <p:sp>
+        <p:nvSpPr>
+          <p:cNvPr id="4" name="TextBox 3">
+            <a:extLst>
+              <a:ext uri="{FF2B5EF4-FFF2-40B4-BE49-F238E27FC236}">
+                <a16:creationId xmlns:a16="http://schemas.microsoft.com/office/drawing/2014/main" id="{F9A30FC6-95B9-4A60-B131-2E6F9192A7CD}"/>
+              </a:ext>
+            </a:extLst>
+          </p:cNvPr>
+          <p:cNvSpPr txBox="1"/>
+          <p:nvPr/>
+        </p:nvSpPr>
+        <p:spPr>
+          <a:xfrm>
+            <a:off x="4312260" y="3547723"/>
+            <a:ext cx="914400" cy="1077218"/>
+          </a:xfrm>
+          <a:prstGeom prst="rect">
+            <a:avLst/>
+          </a:prstGeom>
+          <a:noFill/>
+        </p:spPr>
+        <p:txBody>
+          <a:bodyPr wrap="square" rtlCol="0">
+            <a:spAutoFit/>
+          </a:bodyPr>
+          <a:lstStyle/>
+          <a:p>
+            <a:r>
+              <a:rPr lang="en-US" sz="4600" dirty="0">
+                <a:solidFill>
+                  <a:schemeClr val="bg1"/>
+                </a:solidFill>
+              </a:rPr>
+              <a:t>+</a:t>
+            </a:r>
+          </a:p>
+          <a:p>
+            <a:endParaRPr lang="en-US" dirty="0"/>
+          </a:p>
+        </p:txBody>
+      </p:sp>
+      <p:sp>
+        <p:nvSpPr>
+          <p:cNvPr id="13" name="TextBox 12">
+            <a:extLst>
+              <a:ext uri="{FF2B5EF4-FFF2-40B4-BE49-F238E27FC236}">
+                <a16:creationId xmlns:a16="http://schemas.microsoft.com/office/drawing/2014/main" id="{FB8E4BCF-CBF9-4FE6-963A-906258BCC022}"/>
+              </a:ext>
+            </a:extLst>
+          </p:cNvPr>
+          <p:cNvSpPr txBox="1"/>
+          <p:nvPr/>
+        </p:nvSpPr>
+        <p:spPr>
+          <a:xfrm>
+            <a:off x="3653902" y="3547723"/>
+            <a:ext cx="2137298" cy="769441"/>
+          </a:xfrm>
+          <a:prstGeom prst="rect">
+            <a:avLst/>
+          </a:prstGeom>
+          <a:noFill/>
+        </p:spPr>
+        <p:txBody>
+          <a:bodyPr wrap="square">
+            <a:spAutoFit/>
+          </a:bodyPr>
+          <a:lstStyle/>
+          <a:p>
+            <a:r>
+              <a:rPr lang="en-US" sz="1800" dirty="0"/>
+              <a:t> Trials omitted… </a:t>
+            </a:r>
+            <a:r>
+              <a:rPr lang="en-US" sz="4400" dirty="0">
+                <a:solidFill>
+                  <a:schemeClr val="bg1"/>
+                </a:solidFill>
+              </a:rPr>
+              <a:t>X</a:t>
+            </a:r>
+            <a:endParaRPr lang="en-US" dirty="0"/>
           </a:p>
         </p:txBody>
       </p:sp>
     </p:spTree>
     <p:extLst>
       <p:ext uri="{BB962C8B-B14F-4D97-AF65-F5344CB8AC3E}">
-        <p14:creationId xmlns:p14="http://schemas.microsoft.com/office/powerpoint/2010/main" val="747114730"/>
+        <p14:creationId xmlns:p14="http://schemas.microsoft.com/office/powerpoint/2010/main" val="908588162"/>
       </p:ext>
     </p:extLst>
   </p:cSld>
@@ -8783,7 +9372,7 @@
         <p:spPr>
           <a:xfrm>
             <a:off x="823491" y="1387596"/>
-            <a:ext cx="7902035" cy="4247317"/>
+            <a:ext cx="5603137" cy="4013406"/>
           </a:xfrm>
           <a:prstGeom prst="rect">
             <a:avLst/>
@@ -8797,356 +9386,52 @@
           <a:lstStyle/>
           <a:p>
             <a:r>
-              <a:rPr lang="en-US" dirty="0"/>
-              <a:t>If you </a:t>
-            </a:r>
-            <a:r>
-              <a:rPr lang="en-US" b="1" dirty="0"/>
-              <a:t>do not have to </a:t>
-            </a:r>
-            <a:r>
-              <a:rPr lang="en-US" dirty="0"/>
-              <a:t>perform the trials, you will see the message below</a:t>
-            </a:r>
-            <a:r>
-              <a:rPr lang="en-US" altLang="zh-CN" dirty="0"/>
-              <a:t>.</a:t>
-            </a:r>
-            <a:r>
-              <a:rPr lang="zh-CN" altLang="en-US" dirty="0"/>
-              <a:t> </a:t>
-            </a:r>
-            <a:endParaRPr lang="en-US" altLang="zh-CN" dirty="0"/>
-          </a:p>
-          <a:p>
-            <a:endParaRPr lang="en-US" dirty="0"/>
-          </a:p>
-          <a:p>
-            <a:r>
-              <a:rPr lang="en-US" altLang="zh-CN" dirty="0"/>
-              <a:t>You</a:t>
-            </a:r>
-            <a:r>
-              <a:rPr lang="zh-CN" altLang="en-US" dirty="0"/>
-              <a:t> </a:t>
-            </a:r>
-            <a:r>
-              <a:rPr lang="en-US" altLang="zh-CN" dirty="0"/>
-              <a:t>cannot</a:t>
-            </a:r>
-            <a:r>
-              <a:rPr lang="zh-CN" altLang="en-US" dirty="0"/>
-              <a:t> </a:t>
-            </a:r>
-            <a:r>
-              <a:rPr lang="en-US" altLang="zh-CN" dirty="0"/>
-              <a:t>know</a:t>
-            </a:r>
-            <a:r>
-              <a:rPr lang="zh-CN" altLang="en-US" dirty="0"/>
-              <a:t> </a:t>
-            </a:r>
-            <a:r>
-              <a:rPr lang="en-US" altLang="zh-CN" dirty="0"/>
-              <a:t>before</a:t>
-            </a:r>
-            <a:r>
-              <a:rPr lang="zh-CN" altLang="en-US" dirty="0"/>
-              <a:t> </a:t>
-            </a:r>
-            <a:r>
-              <a:rPr lang="en-US" altLang="zh-CN" dirty="0"/>
-              <a:t>you</a:t>
-            </a:r>
-            <a:r>
-              <a:rPr lang="zh-CN" altLang="en-US" dirty="0"/>
-              <a:t> </a:t>
-            </a:r>
-            <a:r>
-              <a:rPr lang="en-US" altLang="zh-CN" dirty="0"/>
-              <a:t>make</a:t>
-            </a:r>
-            <a:r>
-              <a:rPr lang="zh-CN" altLang="en-US" dirty="0"/>
-              <a:t> </a:t>
-            </a:r>
-            <a:r>
-              <a:rPr lang="en-US" altLang="zh-CN" dirty="0"/>
-              <a:t>a</a:t>
-            </a:r>
-            <a:r>
-              <a:rPr lang="zh-CN" altLang="en-US" dirty="0"/>
-              <a:t> </a:t>
-            </a:r>
-            <a:r>
-              <a:rPr lang="en-US" altLang="zh-CN" dirty="0"/>
-              <a:t>choice</a:t>
-            </a:r>
-            <a:r>
-              <a:rPr lang="zh-CN" altLang="en-US" dirty="0"/>
-              <a:t> </a:t>
-            </a:r>
-            <a:r>
-              <a:rPr lang="en-US" altLang="zh-CN" dirty="0"/>
-              <a:t>whether</a:t>
-            </a:r>
-            <a:r>
-              <a:rPr lang="zh-CN" altLang="en-US" dirty="0"/>
-              <a:t> </a:t>
-            </a:r>
-            <a:r>
-              <a:rPr lang="en-US" altLang="zh-CN" dirty="0"/>
-              <a:t>you</a:t>
-            </a:r>
-            <a:r>
-              <a:rPr lang="zh-CN" altLang="en-US" dirty="0"/>
-              <a:t> </a:t>
-            </a:r>
-            <a:r>
-              <a:rPr lang="en-US" altLang="zh-CN" dirty="0"/>
-              <a:t>will</a:t>
-            </a:r>
-            <a:r>
-              <a:rPr lang="zh-CN" altLang="en-US" dirty="0"/>
-              <a:t> </a:t>
-            </a:r>
-            <a:r>
-              <a:rPr lang="en-US" altLang="zh-CN" dirty="0"/>
-              <a:t>have</a:t>
-            </a:r>
-            <a:r>
-              <a:rPr lang="zh-CN" altLang="en-US" dirty="0"/>
-              <a:t> </a:t>
-            </a:r>
-            <a:r>
-              <a:rPr lang="en-US" altLang="zh-CN" dirty="0"/>
-              <a:t>to</a:t>
-            </a:r>
-            <a:r>
-              <a:rPr lang="zh-CN" altLang="en-US" dirty="0"/>
-              <a:t> </a:t>
-            </a:r>
-            <a:r>
-              <a:rPr lang="en-US" altLang="zh-CN" dirty="0"/>
-              <a:t>do</a:t>
-            </a:r>
-            <a:r>
-              <a:rPr lang="zh-CN" altLang="en-US" dirty="0"/>
-              <a:t> </a:t>
-            </a:r>
-            <a:r>
-              <a:rPr lang="en-US" altLang="zh-CN" dirty="0"/>
-              <a:t>the</a:t>
-            </a:r>
-            <a:r>
-              <a:rPr lang="zh-CN" altLang="en-US" dirty="0"/>
-              <a:t> </a:t>
-            </a:r>
-            <a:r>
-              <a:rPr lang="en-US" altLang="zh-CN" dirty="0"/>
-              <a:t>trials.</a:t>
-            </a:r>
-            <a:r>
-              <a:rPr lang="en-US" dirty="0"/>
-              <a:t> </a:t>
-            </a:r>
-          </a:p>
-          <a:p>
-            <a:endParaRPr lang="en-US" dirty="0"/>
-          </a:p>
-          <a:p>
-            <a:r>
-              <a:rPr lang="en-US" dirty="0"/>
-              <a:t>Please treat every choice like you will have to complete the trials. </a:t>
-            </a:r>
-          </a:p>
-          <a:p>
-            <a:endParaRPr lang="en-US" dirty="0"/>
-          </a:p>
-          <a:p>
-            <a:endParaRPr lang="en-US" dirty="0"/>
-          </a:p>
-          <a:p>
-            <a:endParaRPr lang="en-US" dirty="0"/>
-          </a:p>
-          <a:p>
-            <a:endParaRPr lang="en-US" dirty="0"/>
-          </a:p>
-          <a:p>
-            <a:endParaRPr lang="en-US" dirty="0"/>
-          </a:p>
-          <a:p>
-            <a:endParaRPr lang="en-US" dirty="0"/>
-          </a:p>
-          <a:p>
-            <a:endParaRPr lang="en-US" dirty="0"/>
-          </a:p>
-          <a:p>
-            <a:pPr algn="ctr"/>
-            <a:endParaRPr lang="en-US" dirty="0"/>
-          </a:p>
-          <a:p>
-            <a:pPr algn="ctr"/>
-            <a:endParaRPr lang="en-US" dirty="0"/>
-          </a:p>
-          <a:p>
-            <a:pPr algn="ctr"/>
-            <a:endParaRPr lang="en-US" dirty="0"/>
-          </a:p>
-        </p:txBody>
-      </p:sp>
-      <p:sp>
-        <p:nvSpPr>
-          <p:cNvPr id="6" name="Tekstvak 5">
-            <a:extLst>
-              <a:ext uri="{FF2B5EF4-FFF2-40B4-BE49-F238E27FC236}">
-                <a16:creationId xmlns:a16="http://schemas.microsoft.com/office/drawing/2014/main" id="{A7D3FBCB-F6A3-4FA7-A179-58C1665B6DFD}"/>
-              </a:ext>
-            </a:extLst>
-          </p:cNvPr>
-          <p:cNvSpPr txBox="1"/>
-          <p:nvPr/>
-        </p:nvSpPr>
-        <p:spPr>
-          <a:xfrm>
-            <a:off x="2127358" y="3161463"/>
-            <a:ext cx="4889283" cy="2311402"/>
-          </a:xfrm>
-          <a:prstGeom prst="rect">
-            <a:avLst/>
-          </a:prstGeom>
-          <a:solidFill>
-            <a:schemeClr val="bg1"/>
-          </a:solidFill>
-        </p:spPr>
-        <p:txBody>
-          <a:bodyPr wrap="square" rtlCol="0">
-            <a:spAutoFit/>
-          </a:bodyPr>
-          <a:lstStyle/>
-          <a:p>
-            <a:pPr algn="ctr"/>
-            <a:endParaRPr lang="en-US" sz="1960" dirty="0"/>
-          </a:p>
-          <a:p>
-            <a:pPr algn="ctr"/>
-            <a:r>
-              <a:rPr lang="en-US" sz="4620" dirty="0">
-                <a:solidFill>
-                  <a:schemeClr val="bg1"/>
-                </a:solidFill>
-              </a:rPr>
-              <a:t>+</a:t>
-            </a:r>
-          </a:p>
-          <a:p>
-            <a:pPr algn="ctr"/>
-            <a:endParaRPr lang="en-US" sz="1960" dirty="0"/>
-          </a:p>
-          <a:p>
-            <a:endParaRPr lang="en-US" sz="1960" dirty="0"/>
-          </a:p>
-          <a:p>
-            <a:r>
               <a:rPr lang="en-US" sz="1960" dirty="0"/>
-              <a:t> </a:t>
-            </a:r>
-          </a:p>
-          <a:p>
-            <a:endParaRPr lang="en-US" sz="1960" dirty="0"/>
-          </a:p>
-        </p:txBody>
-      </p:sp>
-      <p:sp>
-        <p:nvSpPr>
-          <p:cNvPr id="4" name="TextBox 3">
-            <a:extLst>
-              <a:ext uri="{FF2B5EF4-FFF2-40B4-BE49-F238E27FC236}">
-                <a16:creationId xmlns:a16="http://schemas.microsoft.com/office/drawing/2014/main" id="{F9A30FC6-95B9-4A60-B131-2E6F9192A7CD}"/>
-              </a:ext>
-            </a:extLst>
-          </p:cNvPr>
-          <p:cNvSpPr txBox="1"/>
-          <p:nvPr/>
-        </p:nvSpPr>
-        <p:spPr>
-          <a:xfrm>
-            <a:off x="4312260" y="3547723"/>
-            <a:ext cx="914400" cy="1077218"/>
-          </a:xfrm>
-          <a:prstGeom prst="rect">
-            <a:avLst/>
-          </a:prstGeom>
-          <a:noFill/>
-        </p:spPr>
-        <p:txBody>
-          <a:bodyPr wrap="square" rtlCol="0">
-            <a:spAutoFit/>
-          </a:bodyPr>
-          <a:lstStyle/>
-          <a:p>
-            <a:r>
-              <a:rPr lang="en-US" sz="4600" dirty="0">
-                <a:solidFill>
-                  <a:schemeClr val="bg1"/>
-                </a:solidFill>
-              </a:rPr>
-              <a:t>+</a:t>
-            </a:r>
-          </a:p>
-          <a:p>
-            <a:endParaRPr lang="en-US" dirty="0"/>
-          </a:p>
-        </p:txBody>
-      </p:sp>
-      <p:sp>
-        <p:nvSpPr>
-          <p:cNvPr id="13" name="TextBox 12">
-            <a:extLst>
-              <a:ext uri="{FF2B5EF4-FFF2-40B4-BE49-F238E27FC236}">
-                <a16:creationId xmlns:a16="http://schemas.microsoft.com/office/drawing/2014/main" id="{FB8E4BCF-CBF9-4FE6-963A-906258BCC022}"/>
-              </a:ext>
-            </a:extLst>
-          </p:cNvPr>
-          <p:cNvSpPr txBox="1"/>
-          <p:nvPr/>
-        </p:nvSpPr>
-        <p:spPr>
-          <a:xfrm>
-            <a:off x="3700811" y="3720542"/>
-            <a:ext cx="2137298" cy="769441"/>
-          </a:xfrm>
-          <a:prstGeom prst="rect">
-            <a:avLst/>
-          </a:prstGeom>
-          <a:noFill/>
-        </p:spPr>
-        <p:txBody>
-          <a:bodyPr wrap="square">
-            <a:spAutoFit/>
-          </a:bodyPr>
-          <a:lstStyle/>
-          <a:p>
-            <a:r>
-              <a:rPr lang="en-US" sz="1800" dirty="0"/>
-              <a:t> Trials omitted… </a:t>
-            </a:r>
-            <a:r>
-              <a:rPr lang="en-US" sz="4400" dirty="0">
-                <a:solidFill>
-                  <a:schemeClr val="bg1"/>
-                </a:solidFill>
-              </a:rPr>
-              <a:t>X</a:t>
-            </a:r>
-            <a:endParaRPr lang="en-US" dirty="0"/>
+              <a:t>Here are a few more things you should keep in mind: </a:t>
+            </a:r>
+          </a:p>
+          <a:p>
+            <a:endParaRPr lang="en-US" sz="1960" dirty="0"/>
+          </a:p>
+          <a:p>
+            <a:endParaRPr lang="en-US" sz="1960" dirty="0"/>
+          </a:p>
+          <a:p>
+            <a:endParaRPr lang="en-US" sz="1960" dirty="0"/>
+          </a:p>
+          <a:p>
+            <a:endParaRPr lang="en-US" sz="1960" dirty="0"/>
+          </a:p>
+          <a:p>
+            <a:endParaRPr lang="en-US" sz="1960" dirty="0"/>
+          </a:p>
+          <a:p>
+            <a:endParaRPr lang="en-US" sz="1960" dirty="0"/>
+          </a:p>
+          <a:p>
+            <a:endParaRPr lang="en-US" sz="1960" dirty="0"/>
+          </a:p>
+          <a:p>
+            <a:endParaRPr lang="en-US" sz="1960" dirty="0"/>
+          </a:p>
+          <a:p>
+            <a:endParaRPr lang="en-US" sz="1960" dirty="0"/>
+          </a:p>
+          <a:p>
+            <a:endParaRPr lang="en-US" sz="1960" dirty="0"/>
+          </a:p>
+          <a:p>
+            <a:endParaRPr lang="en-US" sz="1960" dirty="0"/>
+          </a:p>
+          <a:p>
+            <a:endParaRPr lang="en-US" sz="1960" dirty="0"/>
           </a:p>
         </p:txBody>
       </p:sp>
     </p:spTree>
     <p:extLst>
       <p:ext uri="{BB962C8B-B14F-4D97-AF65-F5344CB8AC3E}">
-        <p14:creationId xmlns:p14="http://schemas.microsoft.com/office/powerpoint/2010/main" val="908588162"/>
+        <p14:creationId xmlns:p14="http://schemas.microsoft.com/office/powerpoint/2010/main" val="1246903257"/>
       </p:ext>
     </p:extLst>
   </p:cSld>

</xml_diff>

<commit_message>
Change back to old instructions
</commit_message>
<xml_diff>
--- a/nivturk-prolific/app/static/Instructions/instructions_DST/instructions_DST.pptx
+++ b/nivturk-prolific/app/static/Instructions/instructions_DST/instructions_DST.pptx
@@ -210,7 +210,7 @@
           <a:p>
             <a:fld id="{2CC4CF8D-9FFA-D94E-9ECF-51D1F1CD8AD5}" type="datetimeFigureOut">
               <a:rPr lang="en-US" smtClean="0"/>
-              <a:t>7/16/2020</a:t>
+              <a:t>5/4/21</a:t>
             </a:fld>
             <a:endParaRPr lang="en-US"/>
           </a:p>
@@ -1854,7 +1854,7 @@
           <a:p>
             <a:fld id="{2F4D30B7-9F9A-4DF0-96B1-87E6F384AC6E}" type="datetimeFigureOut">
               <a:rPr lang="nl-NL" smtClean="0"/>
-              <a:t>16-7-2020</a:t>
+              <a:t>04-05-2021</a:t>
             </a:fld>
             <a:endParaRPr lang="nl-NL"/>
           </a:p>
@@ -2024,7 +2024,7 @@
           <a:p>
             <a:fld id="{2F4D30B7-9F9A-4DF0-96B1-87E6F384AC6E}" type="datetimeFigureOut">
               <a:rPr lang="nl-NL" smtClean="0"/>
-              <a:t>16-7-2020</a:t>
+              <a:t>04-05-2021</a:t>
             </a:fld>
             <a:endParaRPr lang="nl-NL"/>
           </a:p>
@@ -2204,7 +2204,7 @@
           <a:p>
             <a:fld id="{2F4D30B7-9F9A-4DF0-96B1-87E6F384AC6E}" type="datetimeFigureOut">
               <a:rPr lang="nl-NL" smtClean="0"/>
-              <a:t>16-7-2020</a:t>
+              <a:t>04-05-2021</a:t>
             </a:fld>
             <a:endParaRPr lang="nl-NL"/>
           </a:p>
@@ -2374,7 +2374,7 @@
           <a:p>
             <a:fld id="{2F4D30B7-9F9A-4DF0-96B1-87E6F384AC6E}" type="datetimeFigureOut">
               <a:rPr lang="nl-NL" smtClean="0"/>
-              <a:t>16-7-2020</a:t>
+              <a:t>04-05-2021</a:t>
             </a:fld>
             <a:endParaRPr lang="nl-NL"/>
           </a:p>
@@ -2618,7 +2618,7 @@
           <a:p>
             <a:fld id="{2F4D30B7-9F9A-4DF0-96B1-87E6F384AC6E}" type="datetimeFigureOut">
               <a:rPr lang="nl-NL" smtClean="0"/>
-              <a:t>16-7-2020</a:t>
+              <a:t>04-05-2021</a:t>
             </a:fld>
             <a:endParaRPr lang="nl-NL"/>
           </a:p>
@@ -2850,7 +2850,7 @@
           <a:p>
             <a:fld id="{2F4D30B7-9F9A-4DF0-96B1-87E6F384AC6E}" type="datetimeFigureOut">
               <a:rPr lang="nl-NL" smtClean="0"/>
-              <a:t>16-7-2020</a:t>
+              <a:t>04-05-2021</a:t>
             </a:fld>
             <a:endParaRPr lang="nl-NL"/>
           </a:p>
@@ -3217,7 +3217,7 @@
           <a:p>
             <a:fld id="{2F4D30B7-9F9A-4DF0-96B1-87E6F384AC6E}" type="datetimeFigureOut">
               <a:rPr lang="nl-NL" smtClean="0"/>
-              <a:t>16-7-2020</a:t>
+              <a:t>04-05-2021</a:t>
             </a:fld>
             <a:endParaRPr lang="nl-NL"/>
           </a:p>
@@ -3335,7 +3335,7 @@
           <a:p>
             <a:fld id="{2F4D30B7-9F9A-4DF0-96B1-87E6F384AC6E}" type="datetimeFigureOut">
               <a:rPr lang="nl-NL" smtClean="0"/>
-              <a:t>16-7-2020</a:t>
+              <a:t>04-05-2021</a:t>
             </a:fld>
             <a:endParaRPr lang="nl-NL"/>
           </a:p>
@@ -3430,7 +3430,7 @@
           <a:p>
             <a:fld id="{2F4D30B7-9F9A-4DF0-96B1-87E6F384AC6E}" type="datetimeFigureOut">
               <a:rPr lang="nl-NL" smtClean="0"/>
-              <a:t>16-7-2020</a:t>
+              <a:t>04-05-2021</a:t>
             </a:fld>
             <a:endParaRPr lang="nl-NL"/>
           </a:p>
@@ -3707,7 +3707,7 @@
           <a:p>
             <a:fld id="{2F4D30B7-9F9A-4DF0-96B1-87E6F384AC6E}" type="datetimeFigureOut">
               <a:rPr lang="nl-NL" smtClean="0"/>
-              <a:t>16-7-2020</a:t>
+              <a:t>04-05-2021</a:t>
             </a:fld>
             <a:endParaRPr lang="nl-NL"/>
           </a:p>
@@ -3964,7 +3964,7 @@
           <a:p>
             <a:fld id="{2F4D30B7-9F9A-4DF0-96B1-87E6F384AC6E}" type="datetimeFigureOut">
               <a:rPr lang="nl-NL" smtClean="0"/>
-              <a:t>16-7-2020</a:t>
+              <a:t>04-05-2021</a:t>
             </a:fld>
             <a:endParaRPr lang="nl-NL"/>
           </a:p>
@@ -4177,7 +4177,7 @@
           <a:p>
             <a:fld id="{2F4D30B7-9F9A-4DF0-96B1-87E6F384AC6E}" type="datetimeFigureOut">
               <a:rPr lang="nl-NL" smtClean="0"/>
-              <a:t>16-7-2020</a:t>
+              <a:t>04-05-2021</a:t>
             </a:fld>
             <a:endParaRPr lang="nl-NL"/>
           </a:p>
@@ -4782,7 +4782,7 @@
           <a:p>
             <a:r>
               <a:rPr lang="en-US" sz="1960" dirty="0"/>
-              <a:t>Please make a batch choice in under 7 seconds. If you do not make a choice, </a:t>
+              <a:t>Please make a batch choice in under 3 seconds. If you do not make a choice, </a:t>
             </a:r>
           </a:p>
           <a:p>
@@ -5643,7 +5643,7 @@
         <p:spPr>
           <a:xfrm>
             <a:off x="823491" y="1387596"/>
-            <a:ext cx="8148256" cy="5736955"/>
+            <a:ext cx="8281626" cy="5736955"/>
           </a:xfrm>
           <a:prstGeom prst="rect">
             <a:avLst/>
@@ -5664,12 +5664,16 @@
           <a:p>
             <a:r>
               <a:rPr lang="en-US" sz="1960" dirty="0"/>
-              <a:t>and after the trials. So the game will take the same amount of time regardless </a:t>
-            </a:r>
-          </a:p>
-          <a:p>
-            <a:r>
-              <a:rPr lang="en-US" sz="1960" dirty="0"/>
+              <a:t>and after the trials. So </a:t>
+            </a:r>
+            <a:r>
+              <a:rPr lang="en-US" sz="1960" b="1" dirty="0"/>
+              <a:t>the game will take the same amount of time regardless </a:t>
+            </a:r>
+          </a:p>
+          <a:p>
+            <a:r>
+              <a:rPr lang="en-US" sz="1960" b="1" dirty="0"/>
               <a:t>of which batch you choose.</a:t>
             </a:r>
           </a:p>

</xml_diff>